<commit_message>
Update Computational_OverFlow_Flow_Charts.pptx via upload
</commit_message>
<xml_diff>
--- a/Computational_OverFlow_Flow_Charts.pptx
+++ b/Computational_OverFlow_Flow_Charts.pptx
@@ -113,6 +113,602 @@
 </p:presentation>
 </file>
 
+<file path=ppt/revisionInfo.xml><?xml version="1.0" encoding="utf-8"?>
+<p1510:revInfo xmlns:a="http://schemas.openxmlformats.org/drawingml/2006/main" xmlns:r="http://schemas.openxmlformats.org/officeDocument/2006/relationships" xmlns:p1510="http://schemas.microsoft.com/office/powerpoint/2015/10/main">
+  <p1510:revLst>
+    <p1510:client id="{7A5EE4CA-8985-495D-AAF7-D0594B4C61CB}" v="11" dt="2020-03-16T12:07:43.090"/>
+  </p1510:revLst>
+</p1510:revInfo>
+</file>
+
+<file path=ppt/changesInfos/changesInfo1.xml><?xml version="1.0" encoding="utf-8"?>
+<pc:chgInfo xmlns:a="http://schemas.openxmlformats.org/drawingml/2006/main" xmlns:r="http://schemas.openxmlformats.org/officeDocument/2006/relationships" xmlns:ac="http://schemas.microsoft.com/office/drawing/2013/main/command" xmlns:pc="http://schemas.microsoft.com/office/powerpoint/2013/main/command">
+  <pc:docChgLst>
+    <pc:chgData name="Emma Hobbs" userId="a4555268070b5a5b" providerId="LiveId" clId="{7A5EE4CA-8985-495D-AAF7-D0594B4C61CB}"/>
+    <pc:docChg chg="undo custSel modSld">
+      <pc:chgData name="Emma Hobbs" userId="a4555268070b5a5b" providerId="LiveId" clId="{7A5EE4CA-8985-495D-AAF7-D0594B4C61CB}" dt="2020-03-16T12:14:10.822" v="659" actId="6549"/>
+      <pc:docMkLst>
+        <pc:docMk/>
+      </pc:docMkLst>
+      <pc:sldChg chg="addSp delSp modSp mod">
+        <pc:chgData name="Emma Hobbs" userId="a4555268070b5a5b" providerId="LiveId" clId="{7A5EE4CA-8985-495D-AAF7-D0594B4C61CB}" dt="2020-03-16T12:14:10.822" v="659" actId="6549"/>
+        <pc:sldMkLst>
+          <pc:docMk/>
+          <pc:sldMk cId="1391225644" sldId="257"/>
+        </pc:sldMkLst>
+        <pc:spChg chg="del">
+          <ac:chgData name="Emma Hobbs" userId="a4555268070b5a5b" providerId="LiveId" clId="{7A5EE4CA-8985-495D-AAF7-D0594B4C61CB}" dt="2020-03-16T12:06:27.754" v="470" actId="478"/>
+          <ac:spMkLst>
+            <pc:docMk/>
+            <pc:sldMk cId="1391225644" sldId="257"/>
+            <ac:spMk id="2" creationId="{52F1F8BC-D370-4BA9-AFFF-EDE06B095EE0}"/>
+          </ac:spMkLst>
+        </pc:spChg>
+        <pc:spChg chg="mod">
+          <ac:chgData name="Emma Hobbs" userId="a4555268070b5a5b" providerId="LiveId" clId="{7A5EE4CA-8985-495D-AAF7-D0594B4C61CB}" dt="2020-03-16T12:07:43.089" v="483" actId="164"/>
+          <ac:spMkLst>
+            <pc:docMk/>
+            <pc:sldMk cId="1391225644" sldId="257"/>
+            <ac:spMk id="5" creationId="{2E248D1A-A8D2-43F0-B15C-D95B9A19A56D}"/>
+          </ac:spMkLst>
+        </pc:spChg>
+        <pc:spChg chg="mod">
+          <ac:chgData name="Emma Hobbs" userId="a4555268070b5a5b" providerId="LiveId" clId="{7A5EE4CA-8985-495D-AAF7-D0594B4C61CB}" dt="2020-03-16T12:07:43.089" v="483" actId="164"/>
+          <ac:spMkLst>
+            <pc:docMk/>
+            <pc:sldMk cId="1391225644" sldId="257"/>
+            <ac:spMk id="6" creationId="{80E9BCFA-92CF-49D7-846E-62DDF1DA254D}"/>
+          </ac:spMkLst>
+        </pc:spChg>
+        <pc:spChg chg="del mod">
+          <ac:chgData name="Emma Hobbs" userId="a4555268070b5a5b" providerId="LiveId" clId="{7A5EE4CA-8985-495D-AAF7-D0594B4C61CB}" dt="2020-03-16T12:07:18.887" v="481" actId="478"/>
+          <ac:spMkLst>
+            <pc:docMk/>
+            <pc:sldMk cId="1391225644" sldId="257"/>
+            <ac:spMk id="14" creationId="{2DFB4E6B-3B19-4384-B813-77E6EDC4A408}"/>
+          </ac:spMkLst>
+        </pc:spChg>
+        <pc:spChg chg="mod">
+          <ac:chgData name="Emma Hobbs" userId="a4555268070b5a5b" providerId="LiveId" clId="{7A5EE4CA-8985-495D-AAF7-D0594B4C61CB}" dt="2020-03-16T12:07:55.937" v="514" actId="1036"/>
+          <ac:spMkLst>
+            <pc:docMk/>
+            <pc:sldMk cId="1391225644" sldId="257"/>
+            <ac:spMk id="18" creationId="{F1E61786-1BA3-48A5-8889-FE5219D90D5A}"/>
+          </ac:spMkLst>
+        </pc:spChg>
+        <pc:spChg chg="mod">
+          <ac:chgData name="Emma Hobbs" userId="a4555268070b5a5b" providerId="LiveId" clId="{7A5EE4CA-8985-495D-AAF7-D0594B4C61CB}" dt="2020-03-16T12:07:55.937" v="514" actId="1036"/>
+          <ac:spMkLst>
+            <pc:docMk/>
+            <pc:sldMk cId="1391225644" sldId="257"/>
+            <ac:spMk id="19" creationId="{7003A6BE-26BD-4863-A655-C1B10733D8C9}"/>
+          </ac:spMkLst>
+        </pc:spChg>
+        <pc:spChg chg="mod">
+          <ac:chgData name="Emma Hobbs" userId="a4555268070b5a5b" providerId="LiveId" clId="{7A5EE4CA-8985-495D-AAF7-D0594B4C61CB}" dt="2020-03-16T12:07:55.937" v="514" actId="1036"/>
+          <ac:spMkLst>
+            <pc:docMk/>
+            <pc:sldMk cId="1391225644" sldId="257"/>
+            <ac:spMk id="29" creationId="{E83C32C8-B0FC-475A-8360-A14D2276FF18}"/>
+          </ac:spMkLst>
+        </pc:spChg>
+        <pc:spChg chg="mod">
+          <ac:chgData name="Emma Hobbs" userId="a4555268070b5a5b" providerId="LiveId" clId="{7A5EE4CA-8985-495D-AAF7-D0594B4C61CB}" dt="2020-03-16T12:07:55.937" v="514" actId="1036"/>
+          <ac:spMkLst>
+            <pc:docMk/>
+            <pc:sldMk cId="1391225644" sldId="257"/>
+            <ac:spMk id="32" creationId="{DD31A9B3-99EC-4F9E-9324-5A2E7CF55791}"/>
+          </ac:spMkLst>
+        </pc:spChg>
+        <pc:spChg chg="mod">
+          <ac:chgData name="Emma Hobbs" userId="a4555268070b5a5b" providerId="LiveId" clId="{7A5EE4CA-8985-495D-AAF7-D0594B4C61CB}" dt="2020-03-16T12:07:55.937" v="514" actId="1036"/>
+          <ac:spMkLst>
+            <pc:docMk/>
+            <pc:sldMk cId="1391225644" sldId="257"/>
+            <ac:spMk id="37" creationId="{A3B0019B-6594-4E56-8724-3B1AF79F912D}"/>
+          </ac:spMkLst>
+        </pc:spChg>
+        <pc:spChg chg="mod">
+          <ac:chgData name="Emma Hobbs" userId="a4555268070b5a5b" providerId="LiveId" clId="{7A5EE4CA-8985-495D-AAF7-D0594B4C61CB}" dt="2020-03-16T12:07:55.937" v="514" actId="1036"/>
+          <ac:spMkLst>
+            <pc:docMk/>
+            <pc:sldMk cId="1391225644" sldId="257"/>
+            <ac:spMk id="43" creationId="{58B13B3D-E692-4CF2-91E7-6683BC2C15F8}"/>
+          </ac:spMkLst>
+        </pc:spChg>
+        <pc:spChg chg="mod">
+          <ac:chgData name="Emma Hobbs" userId="a4555268070b5a5b" providerId="LiveId" clId="{7A5EE4CA-8985-495D-AAF7-D0594B4C61CB}" dt="2020-03-16T12:07:55.937" v="514" actId="1036"/>
+          <ac:spMkLst>
+            <pc:docMk/>
+            <pc:sldMk cId="1391225644" sldId="257"/>
+            <ac:spMk id="44" creationId="{5A281AF7-CBAC-4776-AECC-B8FDF95883CC}"/>
+          </ac:spMkLst>
+        </pc:spChg>
+        <pc:spChg chg="mod">
+          <ac:chgData name="Emma Hobbs" userId="a4555268070b5a5b" providerId="LiveId" clId="{7A5EE4CA-8985-495D-AAF7-D0594B4C61CB}" dt="2020-03-16T12:07:55.937" v="514" actId="1036"/>
+          <ac:spMkLst>
+            <pc:docMk/>
+            <pc:sldMk cId="1391225644" sldId="257"/>
+            <ac:spMk id="45" creationId="{BF3D5C54-4810-4E09-9941-176E0DAA6D24}"/>
+          </ac:spMkLst>
+        </pc:spChg>
+        <pc:spChg chg="mod">
+          <ac:chgData name="Emma Hobbs" userId="a4555268070b5a5b" providerId="LiveId" clId="{7A5EE4CA-8985-495D-AAF7-D0594B4C61CB}" dt="2020-03-16T12:07:55.937" v="514" actId="1036"/>
+          <ac:spMkLst>
+            <pc:docMk/>
+            <pc:sldMk cId="1391225644" sldId="257"/>
+            <ac:spMk id="46" creationId="{7F456C49-41AF-432E-B8E3-80250BD03FEC}"/>
+          </ac:spMkLst>
+        </pc:spChg>
+        <pc:spChg chg="mod">
+          <ac:chgData name="Emma Hobbs" userId="a4555268070b5a5b" providerId="LiveId" clId="{7A5EE4CA-8985-495D-AAF7-D0594B4C61CB}" dt="2020-03-16T12:07:55.937" v="514" actId="1036"/>
+          <ac:spMkLst>
+            <pc:docMk/>
+            <pc:sldMk cId="1391225644" sldId="257"/>
+            <ac:spMk id="52" creationId="{9E4F913D-00A2-4DED-ACFF-746F151768EB}"/>
+          </ac:spMkLst>
+        </pc:spChg>
+        <pc:spChg chg="mod">
+          <ac:chgData name="Emma Hobbs" userId="a4555268070b5a5b" providerId="LiveId" clId="{7A5EE4CA-8985-495D-AAF7-D0594B4C61CB}" dt="2020-03-16T12:07:55.937" v="514" actId="1036"/>
+          <ac:spMkLst>
+            <pc:docMk/>
+            <pc:sldMk cId="1391225644" sldId="257"/>
+            <ac:spMk id="53" creationId="{E47DD358-B158-4F6B-9ADF-49719714E8D2}"/>
+          </ac:spMkLst>
+        </pc:spChg>
+        <pc:spChg chg="mod">
+          <ac:chgData name="Emma Hobbs" userId="a4555268070b5a5b" providerId="LiveId" clId="{7A5EE4CA-8985-495D-AAF7-D0594B4C61CB}" dt="2020-03-16T12:07:55.937" v="514" actId="1036"/>
+          <ac:spMkLst>
+            <pc:docMk/>
+            <pc:sldMk cId="1391225644" sldId="257"/>
+            <ac:spMk id="55" creationId="{DDB1373F-75A6-48C4-A884-90E52A563542}"/>
+          </ac:spMkLst>
+        </pc:spChg>
+        <pc:spChg chg="mod">
+          <ac:chgData name="Emma Hobbs" userId="a4555268070b5a5b" providerId="LiveId" clId="{7A5EE4CA-8985-495D-AAF7-D0594B4C61CB}" dt="2020-03-16T12:07:55.937" v="514" actId="1036"/>
+          <ac:spMkLst>
+            <pc:docMk/>
+            <pc:sldMk cId="1391225644" sldId="257"/>
+            <ac:spMk id="60" creationId="{C29A5F2B-2630-4B89-8C12-7F9648B4223A}"/>
+          </ac:spMkLst>
+        </pc:spChg>
+        <pc:spChg chg="mod">
+          <ac:chgData name="Emma Hobbs" userId="a4555268070b5a5b" providerId="LiveId" clId="{7A5EE4CA-8985-495D-AAF7-D0594B4C61CB}" dt="2020-03-16T12:07:55.937" v="514" actId="1036"/>
+          <ac:spMkLst>
+            <pc:docMk/>
+            <pc:sldMk cId="1391225644" sldId="257"/>
+            <ac:spMk id="61" creationId="{CBAFC06A-3E06-4C28-9859-5791A3ED2AA7}"/>
+          </ac:spMkLst>
+        </pc:spChg>
+        <pc:spChg chg="mod">
+          <ac:chgData name="Emma Hobbs" userId="a4555268070b5a5b" providerId="LiveId" clId="{7A5EE4CA-8985-495D-AAF7-D0594B4C61CB}" dt="2020-03-16T12:07:55.937" v="514" actId="1036"/>
+          <ac:spMkLst>
+            <pc:docMk/>
+            <pc:sldMk cId="1391225644" sldId="257"/>
+            <ac:spMk id="62" creationId="{F89C44B5-28B9-4376-89AD-22B37822D2DB}"/>
+          </ac:spMkLst>
+        </pc:spChg>
+        <pc:spChg chg="mod">
+          <ac:chgData name="Emma Hobbs" userId="a4555268070b5a5b" providerId="LiveId" clId="{7A5EE4CA-8985-495D-AAF7-D0594B4C61CB}" dt="2020-03-16T12:07:55.937" v="514" actId="1036"/>
+          <ac:spMkLst>
+            <pc:docMk/>
+            <pc:sldMk cId="1391225644" sldId="257"/>
+            <ac:spMk id="63" creationId="{C2B614AF-8760-4426-B2F4-5BD5D0A917EA}"/>
+          </ac:spMkLst>
+        </pc:spChg>
+        <pc:spChg chg="mod">
+          <ac:chgData name="Emma Hobbs" userId="a4555268070b5a5b" providerId="LiveId" clId="{7A5EE4CA-8985-495D-AAF7-D0594B4C61CB}" dt="2020-03-16T12:07:55.937" v="514" actId="1036"/>
+          <ac:spMkLst>
+            <pc:docMk/>
+            <pc:sldMk cId="1391225644" sldId="257"/>
+            <ac:spMk id="64" creationId="{571CA5C4-405F-4E04-9AF8-D8E021F7C90D}"/>
+          </ac:spMkLst>
+        </pc:spChg>
+        <pc:spChg chg="mod">
+          <ac:chgData name="Emma Hobbs" userId="a4555268070b5a5b" providerId="LiveId" clId="{7A5EE4CA-8985-495D-AAF7-D0594B4C61CB}" dt="2020-03-16T12:07:43.089" v="483" actId="164"/>
+          <ac:spMkLst>
+            <pc:docMk/>
+            <pc:sldMk cId="1391225644" sldId="257"/>
+            <ac:spMk id="66" creationId="{CC488942-9D81-47A8-9878-D69231F4189F}"/>
+          </ac:spMkLst>
+        </pc:spChg>
+        <pc:spChg chg="mod">
+          <ac:chgData name="Emma Hobbs" userId="a4555268070b5a5b" providerId="LiveId" clId="{7A5EE4CA-8985-495D-AAF7-D0594B4C61CB}" dt="2020-03-16T12:07:43.089" v="483" actId="164"/>
+          <ac:spMkLst>
+            <pc:docMk/>
+            <pc:sldMk cId="1391225644" sldId="257"/>
+            <ac:spMk id="67" creationId="{2A25AE5D-ED4B-4821-AF48-118C4C5A8552}"/>
+          </ac:spMkLst>
+        </pc:spChg>
+        <pc:spChg chg="add mod">
+          <ac:chgData name="Emma Hobbs" userId="a4555268070b5a5b" providerId="LiveId" clId="{7A5EE4CA-8985-495D-AAF7-D0594B4C61CB}" dt="2020-03-16T12:07:43.089" v="483" actId="164"/>
+          <ac:spMkLst>
+            <pc:docMk/>
+            <pc:sldMk cId="1391225644" sldId="257"/>
+            <ac:spMk id="68" creationId="{890F7AF2-3A73-4337-BED9-80813FCB6737}"/>
+          </ac:spMkLst>
+        </pc:spChg>
+        <pc:spChg chg="mod">
+          <ac:chgData name="Emma Hobbs" userId="a4555268070b5a5b" providerId="LiveId" clId="{7A5EE4CA-8985-495D-AAF7-D0594B4C61CB}" dt="2020-03-16T12:07:43.089" v="483" actId="164"/>
+          <ac:spMkLst>
+            <pc:docMk/>
+            <pc:sldMk cId="1391225644" sldId="257"/>
+            <ac:spMk id="70" creationId="{5B1FC922-8E89-4CE5-82FF-92395C888500}"/>
+          </ac:spMkLst>
+        </pc:spChg>
+        <pc:spChg chg="mod">
+          <ac:chgData name="Emma Hobbs" userId="a4555268070b5a5b" providerId="LiveId" clId="{7A5EE4CA-8985-495D-AAF7-D0594B4C61CB}" dt="2020-03-16T12:07:43.089" v="483" actId="164"/>
+          <ac:spMkLst>
+            <pc:docMk/>
+            <pc:sldMk cId="1391225644" sldId="257"/>
+            <ac:spMk id="72" creationId="{965D4E59-DB2C-494C-95EB-9A293DEA74CF}"/>
+          </ac:spMkLst>
+        </pc:spChg>
+        <pc:spChg chg="mod">
+          <ac:chgData name="Emma Hobbs" userId="a4555268070b5a5b" providerId="LiveId" clId="{7A5EE4CA-8985-495D-AAF7-D0594B4C61CB}" dt="2020-03-16T12:14:10.822" v="659" actId="6549"/>
+          <ac:spMkLst>
+            <pc:docMk/>
+            <pc:sldMk cId="1391225644" sldId="257"/>
+            <ac:spMk id="74" creationId="{B4EA40A6-D993-4327-B332-6BA086810054}"/>
+          </ac:spMkLst>
+        </pc:spChg>
+        <pc:spChg chg="mod">
+          <ac:chgData name="Emma Hobbs" userId="a4555268070b5a5b" providerId="LiveId" clId="{7A5EE4CA-8985-495D-AAF7-D0594B4C61CB}" dt="2020-03-16T12:07:55.937" v="514" actId="1036"/>
+          <ac:spMkLst>
+            <pc:docMk/>
+            <pc:sldMk cId="1391225644" sldId="257"/>
+            <ac:spMk id="75" creationId="{03263CA5-DB70-406C-BB92-C4E32AB19856}"/>
+          </ac:spMkLst>
+        </pc:spChg>
+        <pc:spChg chg="add mod">
+          <ac:chgData name="Emma Hobbs" userId="a4555268070b5a5b" providerId="LiveId" clId="{7A5EE4CA-8985-495D-AAF7-D0594B4C61CB}" dt="2020-03-16T12:07:43.089" v="483" actId="164"/>
+          <ac:spMkLst>
+            <pc:docMk/>
+            <pc:sldMk cId="1391225644" sldId="257"/>
+            <ac:spMk id="76" creationId="{718FEC57-2474-4213-9A85-84418B145B97}"/>
+          </ac:spMkLst>
+        </pc:spChg>
+        <pc:spChg chg="add del">
+          <ac:chgData name="Emma Hobbs" userId="a4555268070b5a5b" providerId="LiveId" clId="{7A5EE4CA-8985-495D-AAF7-D0594B4C61CB}" dt="2020-03-16T12:02:04.774" v="228"/>
+          <ac:spMkLst>
+            <pc:docMk/>
+            <pc:sldMk cId="1391225644" sldId="257"/>
+            <ac:spMk id="77" creationId="{80F88062-E7AC-42FE-865F-0DF8FCE088AF}"/>
+          </ac:spMkLst>
+        </pc:spChg>
+        <pc:spChg chg="add del">
+          <ac:chgData name="Emma Hobbs" userId="a4555268070b5a5b" providerId="LiveId" clId="{7A5EE4CA-8985-495D-AAF7-D0594B4C61CB}" dt="2020-03-16T12:02:06.590" v="230"/>
+          <ac:spMkLst>
+            <pc:docMk/>
+            <pc:sldMk cId="1391225644" sldId="257"/>
+            <ac:spMk id="78" creationId="{49B82517-E80B-4276-B084-04802EC9E48D}"/>
+          </ac:spMkLst>
+        </pc:spChg>
+        <pc:spChg chg="mod">
+          <ac:chgData name="Emma Hobbs" userId="a4555268070b5a5b" providerId="LiveId" clId="{7A5EE4CA-8985-495D-AAF7-D0594B4C61CB}" dt="2020-03-16T12:07:55.937" v="514" actId="1036"/>
+          <ac:spMkLst>
+            <pc:docMk/>
+            <pc:sldMk cId="1391225644" sldId="257"/>
+            <ac:spMk id="79" creationId="{3A093E63-B81F-4122-B871-70DE8ECDF471}"/>
+          </ac:spMkLst>
+        </pc:spChg>
+        <pc:spChg chg="mod">
+          <ac:chgData name="Emma Hobbs" userId="a4555268070b5a5b" providerId="LiveId" clId="{7A5EE4CA-8985-495D-AAF7-D0594B4C61CB}" dt="2020-03-16T12:07:55.937" v="514" actId="1036"/>
+          <ac:spMkLst>
+            <pc:docMk/>
+            <pc:sldMk cId="1391225644" sldId="257"/>
+            <ac:spMk id="80" creationId="{31DE82C4-B1F5-4290-AA8D-1B1641CA4FCF}"/>
+          </ac:spMkLst>
+        </pc:spChg>
+        <pc:spChg chg="mod">
+          <ac:chgData name="Emma Hobbs" userId="a4555268070b5a5b" providerId="LiveId" clId="{7A5EE4CA-8985-495D-AAF7-D0594B4C61CB}" dt="2020-03-16T12:07:55.937" v="514" actId="1036"/>
+          <ac:spMkLst>
+            <pc:docMk/>
+            <pc:sldMk cId="1391225644" sldId="257"/>
+            <ac:spMk id="81" creationId="{D5751FC9-BC63-4CF2-8AB5-FC2EBE319776}"/>
+          </ac:spMkLst>
+        </pc:spChg>
+        <pc:spChg chg="add mod">
+          <ac:chgData name="Emma Hobbs" userId="a4555268070b5a5b" providerId="LiveId" clId="{7A5EE4CA-8985-495D-AAF7-D0594B4C61CB}" dt="2020-03-16T12:07:43.089" v="483" actId="164"/>
+          <ac:spMkLst>
+            <pc:docMk/>
+            <pc:sldMk cId="1391225644" sldId="257"/>
+            <ac:spMk id="87" creationId="{8B45D38A-385B-4D75-891E-96DC400C877A}"/>
+          </ac:spMkLst>
+        </pc:spChg>
+        <pc:spChg chg="mod">
+          <ac:chgData name="Emma Hobbs" userId="a4555268070b5a5b" providerId="LiveId" clId="{7A5EE4CA-8985-495D-AAF7-D0594B4C61CB}" dt="2020-03-16T12:07:55.937" v="514" actId="1036"/>
+          <ac:spMkLst>
+            <pc:docMk/>
+            <pc:sldMk cId="1391225644" sldId="257"/>
+            <ac:spMk id="116" creationId="{B38E0B65-3B9C-4ADF-96DF-2583827DB46A}"/>
+          </ac:spMkLst>
+        </pc:spChg>
+        <pc:spChg chg="mod">
+          <ac:chgData name="Emma Hobbs" userId="a4555268070b5a5b" providerId="LiveId" clId="{7A5EE4CA-8985-495D-AAF7-D0594B4C61CB}" dt="2020-03-16T12:07:55.937" v="514" actId="1036"/>
+          <ac:spMkLst>
+            <pc:docMk/>
+            <pc:sldMk cId="1391225644" sldId="257"/>
+            <ac:spMk id="117" creationId="{0B953F61-F88B-4645-A71E-AAFDAAF23AA2}"/>
+          </ac:spMkLst>
+        </pc:spChg>
+        <pc:grpChg chg="mod">
+          <ac:chgData name="Emma Hobbs" userId="a4555268070b5a5b" providerId="LiveId" clId="{7A5EE4CA-8985-495D-AAF7-D0594B4C61CB}" dt="2020-03-16T12:07:43.089" v="483" actId="164"/>
+          <ac:grpSpMkLst>
+            <pc:docMk/>
+            <pc:sldMk cId="1391225644" sldId="257"/>
+            <ac:grpSpMk id="7" creationId="{4F279F56-716C-4D11-9918-2351AE9F1A79}"/>
+          </ac:grpSpMkLst>
+        </pc:grpChg>
+        <pc:grpChg chg="add mod">
+          <ac:chgData name="Emma Hobbs" userId="a4555268070b5a5b" providerId="LiveId" clId="{7A5EE4CA-8985-495D-AAF7-D0594B4C61CB}" dt="2020-03-16T12:07:43.089" v="483" actId="164"/>
+          <ac:grpSpMkLst>
+            <pc:docMk/>
+            <pc:sldMk cId="1391225644" sldId="257"/>
+            <ac:grpSpMk id="15" creationId="{4ADA4D7F-E767-4840-8670-E45CBA74A7E4}"/>
+          </ac:grpSpMkLst>
+        </pc:grpChg>
+        <pc:cxnChg chg="del mod">
+          <ac:chgData name="Emma Hobbs" userId="a4555268070b5a5b" providerId="LiveId" clId="{7A5EE4CA-8985-495D-AAF7-D0594B4C61CB}" dt="2020-03-16T12:07:20.789" v="482" actId="478"/>
+          <ac:cxnSpMkLst>
+            <pc:docMk/>
+            <pc:sldMk cId="1391225644" sldId="257"/>
+            <ac:cxnSpMk id="8" creationId="{16990CD6-E126-47A8-8291-06269A2A943B}"/>
+          </ac:cxnSpMkLst>
+        </pc:cxnChg>
+        <pc:cxnChg chg="mod">
+          <ac:chgData name="Emma Hobbs" userId="a4555268070b5a5b" providerId="LiveId" clId="{7A5EE4CA-8985-495D-AAF7-D0594B4C61CB}" dt="2020-03-16T12:07:43.089" v="483" actId="164"/>
+          <ac:cxnSpMkLst>
+            <pc:docMk/>
+            <pc:sldMk cId="1391225644" sldId="257"/>
+            <ac:cxnSpMk id="10" creationId="{D9868C56-244A-451F-91A2-02330C0C5C5E}"/>
+          </ac:cxnSpMkLst>
+        </pc:cxnChg>
+        <pc:cxnChg chg="mod">
+          <ac:chgData name="Emma Hobbs" userId="a4555268070b5a5b" providerId="LiveId" clId="{7A5EE4CA-8985-495D-AAF7-D0594B4C61CB}" dt="2020-03-16T12:07:43.089" v="483" actId="164"/>
+          <ac:cxnSpMkLst>
+            <pc:docMk/>
+            <pc:sldMk cId="1391225644" sldId="257"/>
+            <ac:cxnSpMk id="20" creationId="{658808FB-0384-4F82-AE99-29B2A1D7EF48}"/>
+          </ac:cxnSpMkLst>
+        </pc:cxnChg>
+        <pc:cxnChg chg="mod">
+          <ac:chgData name="Emma Hobbs" userId="a4555268070b5a5b" providerId="LiveId" clId="{7A5EE4CA-8985-495D-AAF7-D0594B4C61CB}" dt="2020-03-16T12:08:03.274" v="515" actId="14100"/>
+          <ac:cxnSpMkLst>
+            <pc:docMk/>
+            <pc:sldMk cId="1391225644" sldId="257"/>
+            <ac:cxnSpMk id="24" creationId="{D9ED4F86-E4EC-4564-B12B-F1A22D40C343}"/>
+          </ac:cxnSpMkLst>
+        </pc:cxnChg>
+        <pc:cxnChg chg="mod">
+          <ac:chgData name="Emma Hobbs" userId="a4555268070b5a5b" providerId="LiveId" clId="{7A5EE4CA-8985-495D-AAF7-D0594B4C61CB}" dt="2020-03-16T12:08:07.799" v="516" actId="14100"/>
+          <ac:cxnSpMkLst>
+            <pc:docMk/>
+            <pc:sldMk cId="1391225644" sldId="257"/>
+            <ac:cxnSpMk id="26" creationId="{85E80BDD-8BEB-4A2E-8968-3561B6B3DEF9}"/>
+          </ac:cxnSpMkLst>
+        </pc:cxnChg>
+        <pc:cxnChg chg="mod">
+          <ac:chgData name="Emma Hobbs" userId="a4555268070b5a5b" providerId="LiveId" clId="{7A5EE4CA-8985-495D-AAF7-D0594B4C61CB}" dt="2020-03-16T12:07:55.937" v="514" actId="1036"/>
+          <ac:cxnSpMkLst>
+            <pc:docMk/>
+            <pc:sldMk cId="1391225644" sldId="257"/>
+            <ac:cxnSpMk id="30" creationId="{941BEE2B-0304-4845-B0B6-BDCC5A07D906}"/>
+          </ac:cxnSpMkLst>
+        </pc:cxnChg>
+        <pc:cxnChg chg="mod">
+          <ac:chgData name="Emma Hobbs" userId="a4555268070b5a5b" providerId="LiveId" clId="{7A5EE4CA-8985-495D-AAF7-D0594B4C61CB}" dt="2020-03-16T12:07:55.937" v="514" actId="1036"/>
+          <ac:cxnSpMkLst>
+            <pc:docMk/>
+            <pc:sldMk cId="1391225644" sldId="257"/>
+            <ac:cxnSpMk id="33" creationId="{74812C3B-BAC1-4A88-AF22-B43637633671}"/>
+          </ac:cxnSpMkLst>
+        </pc:cxnChg>
+        <pc:cxnChg chg="mod">
+          <ac:chgData name="Emma Hobbs" userId="a4555268070b5a5b" providerId="LiveId" clId="{7A5EE4CA-8985-495D-AAF7-D0594B4C61CB}" dt="2020-03-16T12:07:55.937" v="514" actId="1036"/>
+          <ac:cxnSpMkLst>
+            <pc:docMk/>
+            <pc:sldMk cId="1391225644" sldId="257"/>
+            <ac:cxnSpMk id="35" creationId="{8CB2C6F0-5542-4C27-A859-C7DFB09A59DE}"/>
+          </ac:cxnSpMkLst>
+        </pc:cxnChg>
+        <pc:cxnChg chg="mod">
+          <ac:chgData name="Emma Hobbs" userId="a4555268070b5a5b" providerId="LiveId" clId="{7A5EE4CA-8985-495D-AAF7-D0594B4C61CB}" dt="2020-03-16T12:07:55.937" v="514" actId="1036"/>
+          <ac:cxnSpMkLst>
+            <pc:docMk/>
+            <pc:sldMk cId="1391225644" sldId="257"/>
+            <ac:cxnSpMk id="38" creationId="{F591DC80-6787-4A59-8721-DD3A3646FA2C}"/>
+          </ac:cxnSpMkLst>
+        </pc:cxnChg>
+        <pc:cxnChg chg="mod">
+          <ac:chgData name="Emma Hobbs" userId="a4555268070b5a5b" providerId="LiveId" clId="{7A5EE4CA-8985-495D-AAF7-D0594B4C61CB}" dt="2020-03-16T12:07:55.937" v="514" actId="1036"/>
+          <ac:cxnSpMkLst>
+            <pc:docMk/>
+            <pc:sldMk cId="1391225644" sldId="257"/>
+            <ac:cxnSpMk id="40" creationId="{AF638ED6-C4BB-4D7C-B63A-4AA0206AF32A}"/>
+          </ac:cxnSpMkLst>
+        </pc:cxnChg>
+        <pc:cxnChg chg="mod">
+          <ac:chgData name="Emma Hobbs" userId="a4555268070b5a5b" providerId="LiveId" clId="{7A5EE4CA-8985-495D-AAF7-D0594B4C61CB}" dt="2020-03-16T12:07:55.937" v="514" actId="1036"/>
+          <ac:cxnSpMkLst>
+            <pc:docMk/>
+            <pc:sldMk cId="1391225644" sldId="257"/>
+            <ac:cxnSpMk id="49" creationId="{30D19542-54DB-4AFB-A092-706064A8F3E6}"/>
+          </ac:cxnSpMkLst>
+        </pc:cxnChg>
+        <pc:cxnChg chg="mod">
+          <ac:chgData name="Emma Hobbs" userId="a4555268070b5a5b" providerId="LiveId" clId="{7A5EE4CA-8985-495D-AAF7-D0594B4C61CB}" dt="2020-03-16T12:07:55.937" v="514" actId="1036"/>
+          <ac:cxnSpMkLst>
+            <pc:docMk/>
+            <pc:sldMk cId="1391225644" sldId="257"/>
+            <ac:cxnSpMk id="54" creationId="{DC7AECC1-B695-4C07-8D1E-087F44E8714F}"/>
+          </ac:cxnSpMkLst>
+        </pc:cxnChg>
+        <pc:cxnChg chg="mod">
+          <ac:chgData name="Emma Hobbs" userId="a4555268070b5a5b" providerId="LiveId" clId="{7A5EE4CA-8985-495D-AAF7-D0594B4C61CB}" dt="2020-03-16T12:07:55.937" v="514" actId="1036"/>
+          <ac:cxnSpMkLst>
+            <pc:docMk/>
+            <pc:sldMk cId="1391225644" sldId="257"/>
+            <ac:cxnSpMk id="65" creationId="{99AF5916-B6B6-4779-9BFF-31F7917AF5E1}"/>
+          </ac:cxnSpMkLst>
+        </pc:cxnChg>
+        <pc:cxnChg chg="mod">
+          <ac:chgData name="Emma Hobbs" userId="a4555268070b5a5b" providerId="LiveId" clId="{7A5EE4CA-8985-495D-AAF7-D0594B4C61CB}" dt="2020-03-16T12:07:55.937" v="514" actId="1036"/>
+          <ac:cxnSpMkLst>
+            <pc:docMk/>
+            <pc:sldMk cId="1391225644" sldId="257"/>
+            <ac:cxnSpMk id="69" creationId="{26D957A4-9FBF-4990-BC7D-9A983B3F053E}"/>
+          </ac:cxnSpMkLst>
+        </pc:cxnChg>
+        <pc:cxnChg chg="mod">
+          <ac:chgData name="Emma Hobbs" userId="a4555268070b5a5b" providerId="LiveId" clId="{7A5EE4CA-8985-495D-AAF7-D0594B4C61CB}" dt="2020-03-16T12:07:43.089" v="483" actId="164"/>
+          <ac:cxnSpMkLst>
+            <pc:docMk/>
+            <pc:sldMk cId="1391225644" sldId="257"/>
+            <ac:cxnSpMk id="71" creationId="{CF7515A4-9C72-4DB1-9C1D-8E9271DAFD7A}"/>
+          </ac:cxnSpMkLst>
+        </pc:cxnChg>
+        <pc:cxnChg chg="add del mod">
+          <ac:chgData name="Emma Hobbs" userId="a4555268070b5a5b" providerId="LiveId" clId="{7A5EE4CA-8985-495D-AAF7-D0594B4C61CB}" dt="2020-03-16T12:02:01.304" v="226" actId="478"/>
+          <ac:cxnSpMkLst>
+            <pc:docMk/>
+            <pc:sldMk cId="1391225644" sldId="257"/>
+            <ac:cxnSpMk id="73" creationId="{E5563F29-7CCA-4F64-8CE1-A711CA237510}"/>
+          </ac:cxnSpMkLst>
+        </pc:cxnChg>
+        <pc:cxnChg chg="mod">
+          <ac:chgData name="Emma Hobbs" userId="a4555268070b5a5b" providerId="LiveId" clId="{7A5EE4CA-8985-495D-AAF7-D0594B4C61CB}" dt="2020-03-16T12:07:55.937" v="514" actId="1036"/>
+          <ac:cxnSpMkLst>
+            <pc:docMk/>
+            <pc:sldMk cId="1391225644" sldId="257"/>
+            <ac:cxnSpMk id="82" creationId="{D224F852-59D8-437E-A202-0817FC1BA703}"/>
+          </ac:cxnSpMkLst>
+        </pc:cxnChg>
+        <pc:cxnChg chg="mod">
+          <ac:chgData name="Emma Hobbs" userId="a4555268070b5a5b" providerId="LiveId" clId="{7A5EE4CA-8985-495D-AAF7-D0594B4C61CB}" dt="2020-03-16T12:07:55.937" v="514" actId="1036"/>
+          <ac:cxnSpMkLst>
+            <pc:docMk/>
+            <pc:sldMk cId="1391225644" sldId="257"/>
+            <ac:cxnSpMk id="83" creationId="{1CD12F51-23E0-4119-B169-D041073BB484}"/>
+          </ac:cxnSpMkLst>
+        </pc:cxnChg>
+        <pc:cxnChg chg="add mod">
+          <ac:chgData name="Emma Hobbs" userId="a4555268070b5a5b" providerId="LiveId" clId="{7A5EE4CA-8985-495D-AAF7-D0594B4C61CB}" dt="2020-03-16T12:07:43.089" v="483" actId="164"/>
+          <ac:cxnSpMkLst>
+            <pc:docMk/>
+            <pc:sldMk cId="1391225644" sldId="257"/>
+            <ac:cxnSpMk id="84" creationId="{6268912F-9A0E-4B9A-9AF5-76A8C91B96F7}"/>
+          </ac:cxnSpMkLst>
+        </pc:cxnChg>
+        <pc:cxnChg chg="mod">
+          <ac:chgData name="Emma Hobbs" userId="a4555268070b5a5b" providerId="LiveId" clId="{7A5EE4CA-8985-495D-AAF7-D0594B4C61CB}" dt="2020-03-16T12:07:55.937" v="514" actId="1036"/>
+          <ac:cxnSpMkLst>
+            <pc:docMk/>
+            <pc:sldMk cId="1391225644" sldId="257"/>
+            <ac:cxnSpMk id="85" creationId="{7D1A153D-4263-4320-9E37-0DEA0C0413DF}"/>
+          </ac:cxnSpMkLst>
+        </pc:cxnChg>
+        <pc:cxnChg chg="add mod">
+          <ac:chgData name="Emma Hobbs" userId="a4555268070b5a5b" providerId="LiveId" clId="{7A5EE4CA-8985-495D-AAF7-D0594B4C61CB}" dt="2020-03-16T12:07:43.089" v="483" actId="164"/>
+          <ac:cxnSpMkLst>
+            <pc:docMk/>
+            <pc:sldMk cId="1391225644" sldId="257"/>
+            <ac:cxnSpMk id="86" creationId="{BB94604A-2B33-42ED-9E21-E49A9DDEBC06}"/>
+          </ac:cxnSpMkLst>
+        </pc:cxnChg>
+        <pc:cxnChg chg="mod">
+          <ac:chgData name="Emma Hobbs" userId="a4555268070b5a5b" providerId="LiveId" clId="{7A5EE4CA-8985-495D-AAF7-D0594B4C61CB}" dt="2020-03-16T12:07:55.937" v="514" actId="1036"/>
+          <ac:cxnSpMkLst>
+            <pc:docMk/>
+            <pc:sldMk cId="1391225644" sldId="257"/>
+            <ac:cxnSpMk id="98" creationId="{A707C4C9-1FDD-44E4-B133-3251AE247B31}"/>
+          </ac:cxnSpMkLst>
+        </pc:cxnChg>
+        <pc:cxnChg chg="mod">
+          <ac:chgData name="Emma Hobbs" userId="a4555268070b5a5b" providerId="LiveId" clId="{7A5EE4CA-8985-495D-AAF7-D0594B4C61CB}" dt="2020-03-16T12:07:55.937" v="514" actId="1036"/>
+          <ac:cxnSpMkLst>
+            <pc:docMk/>
+            <pc:sldMk cId="1391225644" sldId="257"/>
+            <ac:cxnSpMk id="100" creationId="{01C72306-5BA6-481B-9A7D-A90CE6250026}"/>
+          </ac:cxnSpMkLst>
+        </pc:cxnChg>
+        <pc:cxnChg chg="mod">
+          <ac:chgData name="Emma Hobbs" userId="a4555268070b5a5b" providerId="LiveId" clId="{7A5EE4CA-8985-495D-AAF7-D0594B4C61CB}" dt="2020-03-16T12:07:55.937" v="514" actId="1036"/>
+          <ac:cxnSpMkLst>
+            <pc:docMk/>
+            <pc:sldMk cId="1391225644" sldId="257"/>
+            <ac:cxnSpMk id="103" creationId="{1BB40029-4A74-4DD1-A215-4230B7007216}"/>
+          </ac:cxnSpMkLst>
+        </pc:cxnChg>
+        <pc:cxnChg chg="mod">
+          <ac:chgData name="Emma Hobbs" userId="a4555268070b5a5b" providerId="LiveId" clId="{7A5EE4CA-8985-495D-AAF7-D0594B4C61CB}" dt="2020-03-16T12:07:55.937" v="514" actId="1036"/>
+          <ac:cxnSpMkLst>
+            <pc:docMk/>
+            <pc:sldMk cId="1391225644" sldId="257"/>
+            <ac:cxnSpMk id="107" creationId="{38493D4F-9B07-47F7-B911-B96AC2843F6D}"/>
+          </ac:cxnSpMkLst>
+        </pc:cxnChg>
+        <pc:cxnChg chg="mod">
+          <ac:chgData name="Emma Hobbs" userId="a4555268070b5a5b" providerId="LiveId" clId="{7A5EE4CA-8985-495D-AAF7-D0594B4C61CB}" dt="2020-03-16T12:07:55.937" v="514" actId="1036"/>
+          <ac:cxnSpMkLst>
+            <pc:docMk/>
+            <pc:sldMk cId="1391225644" sldId="257"/>
+            <ac:cxnSpMk id="110" creationId="{EFA83D0A-4A8F-4A7C-AE09-F505D7E6791D}"/>
+          </ac:cxnSpMkLst>
+        </pc:cxnChg>
+        <pc:cxnChg chg="mod">
+          <ac:chgData name="Emma Hobbs" userId="a4555268070b5a5b" providerId="LiveId" clId="{7A5EE4CA-8985-495D-AAF7-D0594B4C61CB}" dt="2020-03-16T12:07:55.937" v="514" actId="1036"/>
+          <ac:cxnSpMkLst>
+            <pc:docMk/>
+            <pc:sldMk cId="1391225644" sldId="257"/>
+            <ac:cxnSpMk id="111" creationId="{446CB344-92DB-4CE1-9B47-59947A212CB8}"/>
+          </ac:cxnSpMkLst>
+        </pc:cxnChg>
+        <pc:cxnChg chg="mod">
+          <ac:chgData name="Emma Hobbs" userId="a4555268070b5a5b" providerId="LiveId" clId="{7A5EE4CA-8985-495D-AAF7-D0594B4C61CB}" dt="2020-03-16T12:07:55.937" v="514" actId="1036"/>
+          <ac:cxnSpMkLst>
+            <pc:docMk/>
+            <pc:sldMk cId="1391225644" sldId="257"/>
+            <ac:cxnSpMk id="114" creationId="{1F7699DF-D62B-4E18-8528-4B46E2181092}"/>
+          </ac:cxnSpMkLst>
+        </pc:cxnChg>
+        <pc:cxnChg chg="mod">
+          <ac:chgData name="Emma Hobbs" userId="a4555268070b5a5b" providerId="LiveId" clId="{7A5EE4CA-8985-495D-AAF7-D0594B4C61CB}" dt="2020-03-16T12:07:55.937" v="514" actId="1036"/>
+          <ac:cxnSpMkLst>
+            <pc:docMk/>
+            <pc:sldMk cId="1391225644" sldId="257"/>
+            <ac:cxnSpMk id="118" creationId="{0EE42359-A38D-44B7-8E14-2F4408DB2C31}"/>
+          </ac:cxnSpMkLst>
+        </pc:cxnChg>
+        <pc:cxnChg chg="mod">
+          <ac:chgData name="Emma Hobbs" userId="a4555268070b5a5b" providerId="LiveId" clId="{7A5EE4CA-8985-495D-AAF7-D0594B4C61CB}" dt="2020-03-16T12:07:55.937" v="514" actId="1036"/>
+          <ac:cxnSpMkLst>
+            <pc:docMk/>
+            <pc:sldMk cId="1391225644" sldId="257"/>
+            <ac:cxnSpMk id="120" creationId="{780FDA77-85B5-4888-8919-98BA3C520476}"/>
+          </ac:cxnSpMkLst>
+        </pc:cxnChg>
+      </pc:sldChg>
+      <pc:sldChg chg="modSp mod">
+        <pc:chgData name="Emma Hobbs" userId="a4555268070b5a5b" providerId="LiveId" clId="{7A5EE4CA-8985-495D-AAF7-D0594B4C61CB}" dt="2020-03-16T12:08:32.909" v="535" actId="20577"/>
+        <pc:sldMkLst>
+          <pc:docMk/>
+          <pc:sldMk cId="399537007" sldId="258"/>
+        </pc:sldMkLst>
+        <pc:spChg chg="mod">
+          <ac:chgData name="Emma Hobbs" userId="a4555268070b5a5b" providerId="LiveId" clId="{7A5EE4CA-8985-495D-AAF7-D0594B4C61CB}" dt="2020-03-16T12:08:32.909" v="535" actId="20577"/>
+          <ac:spMkLst>
+            <pc:docMk/>
+            <pc:sldMk cId="399537007" sldId="258"/>
+            <ac:spMk id="5" creationId="{6E0F67F3-BB23-480C-A7D9-D85A7BA87E62}"/>
+          </ac:spMkLst>
+        </pc:spChg>
+      </pc:sldChg>
+    </pc:docChg>
+  </pc:docChgLst>
+</pc:chgInfo>
+</file>
+
 <file path=ppt/slideLayouts/slideLayout1.xml><?xml version="1.0" encoding="utf-8"?>
 <p:sldLayout xmlns:a="http://schemas.openxmlformats.org/drawingml/2006/main" xmlns:r="http://schemas.openxmlformats.org/officeDocument/2006/relationships" xmlns:p="http://schemas.openxmlformats.org/presentationml/2006/main" type="title" preserve="1">
   <p:cSld name="Title Slide">
@@ -244,7 +840,7 @@
           <a:p>
             <a:fld id="{D682CE29-8FAE-449E-A441-7A8BCDBC043E}" type="datetimeFigureOut">
               <a:rPr lang="en-GB" smtClean="0"/>
-              <a:t>10/03/2020</a:t>
+              <a:t>16/03/2020</a:t>
             </a:fld>
             <a:endParaRPr lang="en-GB"/>
           </a:p>
@@ -414,7 +1010,7 @@
           <a:p>
             <a:fld id="{D682CE29-8FAE-449E-A441-7A8BCDBC043E}" type="datetimeFigureOut">
               <a:rPr lang="en-GB" smtClean="0"/>
-              <a:t>10/03/2020</a:t>
+              <a:t>16/03/2020</a:t>
             </a:fld>
             <a:endParaRPr lang="en-GB"/>
           </a:p>
@@ -594,7 +1190,7 @@
           <a:p>
             <a:fld id="{D682CE29-8FAE-449E-A441-7A8BCDBC043E}" type="datetimeFigureOut">
               <a:rPr lang="en-GB" smtClean="0"/>
-              <a:t>10/03/2020</a:t>
+              <a:t>16/03/2020</a:t>
             </a:fld>
             <a:endParaRPr lang="en-GB"/>
           </a:p>
@@ -764,7 +1360,7 @@
           <a:p>
             <a:fld id="{D682CE29-8FAE-449E-A441-7A8BCDBC043E}" type="datetimeFigureOut">
               <a:rPr lang="en-GB" smtClean="0"/>
-              <a:t>10/03/2020</a:t>
+              <a:t>16/03/2020</a:t>
             </a:fld>
             <a:endParaRPr lang="en-GB"/>
           </a:p>
@@ -1008,7 +1604,7 @@
           <a:p>
             <a:fld id="{D682CE29-8FAE-449E-A441-7A8BCDBC043E}" type="datetimeFigureOut">
               <a:rPr lang="en-GB" smtClean="0"/>
-              <a:t>10/03/2020</a:t>
+              <a:t>16/03/2020</a:t>
             </a:fld>
             <a:endParaRPr lang="en-GB"/>
           </a:p>
@@ -1240,7 +1836,7 @@
           <a:p>
             <a:fld id="{D682CE29-8FAE-449E-A441-7A8BCDBC043E}" type="datetimeFigureOut">
               <a:rPr lang="en-GB" smtClean="0"/>
-              <a:t>10/03/2020</a:t>
+              <a:t>16/03/2020</a:t>
             </a:fld>
             <a:endParaRPr lang="en-GB"/>
           </a:p>
@@ -1607,7 +2203,7 @@
           <a:p>
             <a:fld id="{D682CE29-8FAE-449E-A441-7A8BCDBC043E}" type="datetimeFigureOut">
               <a:rPr lang="en-GB" smtClean="0"/>
-              <a:t>10/03/2020</a:t>
+              <a:t>16/03/2020</a:t>
             </a:fld>
             <a:endParaRPr lang="en-GB"/>
           </a:p>
@@ -1725,7 +2321,7 @@
           <a:p>
             <a:fld id="{D682CE29-8FAE-449E-A441-7A8BCDBC043E}" type="datetimeFigureOut">
               <a:rPr lang="en-GB" smtClean="0"/>
-              <a:t>10/03/2020</a:t>
+              <a:t>16/03/2020</a:t>
             </a:fld>
             <a:endParaRPr lang="en-GB"/>
           </a:p>
@@ -1820,7 +2416,7 @@
           <a:p>
             <a:fld id="{D682CE29-8FAE-449E-A441-7A8BCDBC043E}" type="datetimeFigureOut">
               <a:rPr lang="en-GB" smtClean="0"/>
-              <a:t>10/03/2020</a:t>
+              <a:t>16/03/2020</a:t>
             </a:fld>
             <a:endParaRPr lang="en-GB"/>
           </a:p>
@@ -2097,7 +2693,7 @@
           <a:p>
             <a:fld id="{D682CE29-8FAE-449E-A441-7A8BCDBC043E}" type="datetimeFigureOut">
               <a:rPr lang="en-GB" smtClean="0"/>
-              <a:t>10/03/2020</a:t>
+              <a:t>16/03/2020</a:t>
             </a:fld>
             <a:endParaRPr lang="en-GB"/>
           </a:p>
@@ -2354,7 +2950,7 @@
           <a:p>
             <a:fld id="{D682CE29-8FAE-449E-A441-7A8BCDBC043E}" type="datetimeFigureOut">
               <a:rPr lang="en-GB" smtClean="0"/>
-              <a:t>10/03/2020</a:t>
+              <a:t>16/03/2020</a:t>
             </a:fld>
             <a:endParaRPr lang="en-GB"/>
           </a:p>
@@ -2567,7 +3163,7 @@
           <a:p>
             <a:fld id="{D682CE29-8FAE-449E-A441-7A8BCDBC043E}" type="datetimeFigureOut">
               <a:rPr lang="en-GB" smtClean="0"/>
-              <a:t>10/03/2020</a:t>
+              <a:t>16/03/2020</a:t>
             </a:fld>
             <a:endParaRPr lang="en-GB"/>
           </a:p>
@@ -2974,287 +3570,6 @@
       </p:grpSpPr>
       <p:sp>
         <p:nvSpPr>
-          <p:cNvPr id="2" name="Rectangle: Rounded Corners 1">
-            <a:extLst>
-              <a:ext uri="{FF2B5EF4-FFF2-40B4-BE49-F238E27FC236}">
-                <a16:creationId xmlns:a16="http://schemas.microsoft.com/office/drawing/2014/main" id="{52F1F8BC-D370-4BA9-AFFF-EDE06B095EE0}"/>
-              </a:ext>
-            </a:extLst>
-          </p:cNvPr>
-          <p:cNvSpPr/>
-          <p:nvPr/>
-        </p:nvSpPr>
-        <p:spPr>
-          <a:xfrm>
-            <a:off x="0" y="8731"/>
-            <a:ext cx="1149350" cy="431800"/>
-          </a:xfrm>
-          <a:prstGeom prst="roundRect">
-            <a:avLst/>
-          </a:prstGeom>
-          <a:solidFill>
-            <a:srgbClr val="0070C0"/>
-          </a:solidFill>
-          <a:ln>
-            <a:solidFill>
-              <a:srgbClr val="002060"/>
-            </a:solidFill>
-          </a:ln>
-        </p:spPr>
-        <p:style>
-          <a:lnRef idx="2">
-            <a:schemeClr val="accent5">
-              <a:shade val="50000"/>
-            </a:schemeClr>
-          </a:lnRef>
-          <a:fillRef idx="1">
-            <a:schemeClr val="accent5"/>
-          </a:fillRef>
-          <a:effectRef idx="0">
-            <a:schemeClr val="accent5"/>
-          </a:effectRef>
-          <a:fontRef idx="minor">
-            <a:schemeClr val="lt1"/>
-          </a:fontRef>
-        </p:style>
-        <p:txBody>
-          <a:bodyPr rot="0" spcFirstLastPara="0" vertOverflow="overflow" horzOverflow="overflow" vert="horz" wrap="square" lIns="91440" tIns="45720" rIns="91440" bIns="45720" numCol="1" spcCol="0" rtlCol="0" fromWordArt="0" anchor="ctr" anchorCtr="0" forceAA="0" compatLnSpc="1">
-            <a:prstTxWarp prst="textNoShape">
-              <a:avLst/>
-            </a:prstTxWarp>
-            <a:noAutofit/>
-          </a:bodyPr>
-          <a:lstStyle/>
-          <a:p>
-            <a:pPr algn="ctr"/>
-            <a:r>
-              <a:rPr lang="en-GB" dirty="0"/>
-              <a:t>Start</a:t>
-            </a:r>
-          </a:p>
-        </p:txBody>
-      </p:sp>
-      <p:sp>
-        <p:nvSpPr>
-          <p:cNvPr id="5" name="TextBox 4">
-            <a:extLst>
-              <a:ext uri="{FF2B5EF4-FFF2-40B4-BE49-F238E27FC236}">
-                <a16:creationId xmlns:a16="http://schemas.microsoft.com/office/drawing/2014/main" id="{2E248D1A-A8D2-43F0-B15C-D95B9A19A56D}"/>
-              </a:ext>
-            </a:extLst>
-          </p:cNvPr>
-          <p:cNvSpPr txBox="1"/>
-          <p:nvPr/>
-        </p:nvSpPr>
-        <p:spPr>
-          <a:xfrm>
-            <a:off x="4415354" y="1085243"/>
-            <a:ext cx="719941" cy="276999"/>
-          </a:xfrm>
-          <a:prstGeom prst="rect">
-            <a:avLst/>
-          </a:prstGeom>
-          <a:noFill/>
-        </p:spPr>
-        <p:txBody>
-          <a:bodyPr wrap="none" rtlCol="0">
-            <a:spAutoFit/>
-          </a:bodyPr>
-          <a:lstStyle/>
-          <a:p>
-            <a:r>
-              <a:rPr lang="en-GB" sz="1200" i="1" dirty="0">
-                <a:solidFill>
-                  <a:schemeClr val="accent2">
-                    <a:lumMod val="75000"/>
-                  </a:schemeClr>
-                </a:solidFill>
-              </a:rPr>
-              <a:t>Leighton</a:t>
-            </a:r>
-          </a:p>
-        </p:txBody>
-      </p:sp>
-      <p:sp>
-        <p:nvSpPr>
-          <p:cNvPr id="6" name="TextBox 5">
-            <a:extLst>
-              <a:ext uri="{FF2B5EF4-FFF2-40B4-BE49-F238E27FC236}">
-                <a16:creationId xmlns:a16="http://schemas.microsoft.com/office/drawing/2014/main" id="{80E9BCFA-92CF-49D7-846E-62DDF1DA254D}"/>
-              </a:ext>
-            </a:extLst>
-          </p:cNvPr>
-          <p:cNvSpPr txBox="1"/>
-          <p:nvPr/>
-        </p:nvSpPr>
-        <p:spPr>
-          <a:xfrm>
-            <a:off x="718290" y="741394"/>
-            <a:ext cx="1961915" cy="646331"/>
-          </a:xfrm>
-          <a:prstGeom prst="rect">
-            <a:avLst/>
-          </a:prstGeom>
-          <a:noFill/>
-        </p:spPr>
-        <p:txBody>
-          <a:bodyPr wrap="square" rtlCol="0">
-            <a:spAutoFit/>
-          </a:bodyPr>
-          <a:lstStyle/>
-          <a:p>
-            <a:pPr algn="ctr"/>
-            <a:r>
-              <a:rPr lang="en-GB" sz="1200" i="1" dirty="0">
-                <a:solidFill>
-                  <a:schemeClr val="accent2">
-                    <a:lumMod val="75000"/>
-                  </a:schemeClr>
-                </a:solidFill>
-              </a:rPr>
-              <a:t>Filter plant pathogens and biomass degraders – evidence from literature</a:t>
-            </a:r>
-          </a:p>
-        </p:txBody>
-      </p:sp>
-      <p:cxnSp>
-        <p:nvCxnSpPr>
-          <p:cNvPr id="8" name="Straight Arrow Connector 7">
-            <a:extLst>
-              <a:ext uri="{FF2B5EF4-FFF2-40B4-BE49-F238E27FC236}">
-                <a16:creationId xmlns:a16="http://schemas.microsoft.com/office/drawing/2014/main" id="{16990CD6-E126-47A8-8291-06269A2A943B}"/>
-              </a:ext>
-            </a:extLst>
-          </p:cNvPr>
-          <p:cNvCxnSpPr>
-            <a:cxnSpLocks/>
-          </p:cNvCxnSpPr>
-          <p:nvPr/>
-        </p:nvCxnSpPr>
-        <p:spPr>
-          <a:xfrm>
-            <a:off x="3428997" y="1342575"/>
-            <a:ext cx="2" cy="847848"/>
-          </a:xfrm>
-          <a:prstGeom prst="straightConnector1">
-            <a:avLst/>
-          </a:prstGeom>
-          <a:ln>
-            <a:solidFill>
-              <a:schemeClr val="bg1">
-                <a:lumMod val="50000"/>
-              </a:schemeClr>
-            </a:solidFill>
-            <a:tailEnd type="triangle"/>
-          </a:ln>
-        </p:spPr>
-        <p:style>
-          <a:lnRef idx="1">
-            <a:schemeClr val="dk1"/>
-          </a:lnRef>
-          <a:fillRef idx="0">
-            <a:schemeClr val="dk1"/>
-          </a:fillRef>
-          <a:effectRef idx="0">
-            <a:schemeClr val="dk1"/>
-          </a:effectRef>
-          <a:fontRef idx="minor">
-            <a:schemeClr val="tx1"/>
-          </a:fontRef>
-        </p:style>
-      </p:cxnSp>
-      <p:cxnSp>
-        <p:nvCxnSpPr>
-          <p:cNvPr id="10" name="Straight Arrow Connector 9">
-            <a:extLst>
-              <a:ext uri="{FF2B5EF4-FFF2-40B4-BE49-F238E27FC236}">
-                <a16:creationId xmlns:a16="http://schemas.microsoft.com/office/drawing/2014/main" id="{D9868C56-244A-451F-91A2-02330C0C5C5E}"/>
-              </a:ext>
-            </a:extLst>
-          </p:cNvPr>
-          <p:cNvCxnSpPr>
-            <a:cxnSpLocks/>
-          </p:cNvCxnSpPr>
-          <p:nvPr/>
-        </p:nvCxnSpPr>
-        <p:spPr>
-          <a:xfrm flipH="1">
-            <a:off x="3972514" y="1234919"/>
-            <a:ext cx="482528" cy="0"/>
-          </a:xfrm>
-          <a:prstGeom prst="straightConnector1">
-            <a:avLst/>
-          </a:prstGeom>
-          <a:ln>
-            <a:tailEnd type="triangle"/>
-          </a:ln>
-        </p:spPr>
-        <p:style>
-          <a:lnRef idx="1">
-            <a:schemeClr val="accent2"/>
-          </a:lnRef>
-          <a:fillRef idx="0">
-            <a:schemeClr val="accent2"/>
-          </a:fillRef>
-          <a:effectRef idx="0">
-            <a:schemeClr val="accent2"/>
-          </a:effectRef>
-          <a:fontRef idx="minor">
-            <a:schemeClr val="tx1"/>
-          </a:fontRef>
-        </p:style>
-      </p:cxnSp>
-      <p:sp>
-        <p:nvSpPr>
-          <p:cNvPr id="14" name="TextBox 13">
-            <a:extLst>
-              <a:ext uri="{FF2B5EF4-FFF2-40B4-BE49-F238E27FC236}">
-                <a16:creationId xmlns:a16="http://schemas.microsoft.com/office/drawing/2014/main" id="{2DFB4E6B-3B19-4384-B813-77E6EDC4A408}"/>
-              </a:ext>
-            </a:extLst>
-          </p:cNvPr>
-          <p:cNvSpPr txBox="1"/>
-          <p:nvPr/>
-        </p:nvSpPr>
-        <p:spPr>
-          <a:xfrm>
-            <a:off x="2723452" y="2127430"/>
-            <a:ext cx="1416286" cy="307777"/>
-          </a:xfrm>
-          <a:prstGeom prst="rect">
-            <a:avLst/>
-          </a:prstGeom>
-          <a:noFill/>
-        </p:spPr>
-        <p:txBody>
-          <a:bodyPr wrap="none" rtlCol="0">
-            <a:spAutoFit/>
-          </a:bodyPr>
-          <a:lstStyle/>
-          <a:p>
-            <a:pPr algn="ctr"/>
-            <a:r>
-              <a:rPr lang="en-GB" sz="1400" b="1" dirty="0">
-                <a:solidFill>
-                  <a:schemeClr val="bg1">
-                    <a:lumMod val="50000"/>
-                  </a:schemeClr>
-                </a:solidFill>
-              </a:rPr>
-              <a:t>Extract genomes</a:t>
-            </a:r>
-            <a:endParaRPr lang="en-GB" sz="1200" b="1" dirty="0">
-              <a:solidFill>
-                <a:schemeClr val="bg1">
-                  <a:lumMod val="50000"/>
-                </a:schemeClr>
-              </a:solidFill>
-            </a:endParaRPr>
-          </a:p>
-        </p:txBody>
-      </p:sp>
-      <p:sp>
-        <p:nvSpPr>
           <p:cNvPr id="18" name="TextBox 17">
             <a:extLst>
               <a:ext uri="{FF2B5EF4-FFF2-40B4-BE49-F238E27FC236}">
@@ -3267,7 +3582,7 @@
         </p:nvSpPr>
         <p:spPr>
           <a:xfrm>
-            <a:off x="4878129" y="2692529"/>
+            <a:off x="4878129" y="3568829"/>
             <a:ext cx="1665008" cy="307777"/>
           </a:xfrm>
           <a:prstGeom prst="rect">
@@ -3316,7 +3631,7 @@
         </p:nvSpPr>
         <p:spPr>
           <a:xfrm>
-            <a:off x="609350" y="2674098"/>
+            <a:off x="609350" y="3550398"/>
             <a:ext cx="1857368" cy="307777"/>
           </a:xfrm>
           <a:prstGeom prst="rect">
@@ -3351,47 +3666,6 @@
           </a:p>
         </p:txBody>
       </p:sp>
-      <p:cxnSp>
-        <p:nvCxnSpPr>
-          <p:cNvPr id="20" name="Straight Arrow Connector 19">
-            <a:extLst>
-              <a:ext uri="{FF2B5EF4-FFF2-40B4-BE49-F238E27FC236}">
-                <a16:creationId xmlns:a16="http://schemas.microsoft.com/office/drawing/2014/main" id="{658808FB-0384-4F82-AE99-29B2A1D7EF48}"/>
-              </a:ext>
-            </a:extLst>
-          </p:cNvPr>
-          <p:cNvCxnSpPr>
-            <a:cxnSpLocks/>
-          </p:cNvCxnSpPr>
-          <p:nvPr/>
-        </p:nvCxnSpPr>
-        <p:spPr>
-          <a:xfrm flipH="1">
-            <a:off x="1746878" y="336661"/>
-            <a:ext cx="0" cy="438073"/>
-          </a:xfrm>
-          <a:prstGeom prst="straightConnector1">
-            <a:avLst/>
-          </a:prstGeom>
-          <a:ln>
-            <a:tailEnd type="triangle"/>
-          </a:ln>
-        </p:spPr>
-        <p:style>
-          <a:lnRef idx="1">
-            <a:schemeClr val="accent2"/>
-          </a:lnRef>
-          <a:fillRef idx="0">
-            <a:schemeClr val="accent2"/>
-          </a:fillRef>
-          <a:effectRef idx="0">
-            <a:schemeClr val="accent2"/>
-          </a:effectRef>
-          <a:fontRef idx="minor">
-            <a:schemeClr val="tx1"/>
-          </a:fontRef>
-        </p:style>
-      </p:cxnSp>
       <p:cxnSp>
         <p:nvCxnSpPr>
           <p:cNvPr id="24" name="Straight Arrow Connector 23">
@@ -3408,8 +3682,8 @@
         </p:nvCxnSpPr>
         <p:spPr>
           <a:xfrm flipH="1">
-            <a:off x="1958339" y="2295442"/>
-            <a:ext cx="853440" cy="468857"/>
+            <a:off x="1958339" y="2905382"/>
+            <a:ext cx="1488181" cy="735217"/>
           </a:xfrm>
           <a:prstGeom prst="straightConnector1">
             <a:avLst/>
@@ -3454,8 +3728,8 @@
         </p:nvCxnSpPr>
         <p:spPr>
           <a:xfrm>
-            <a:off x="4046221" y="2281318"/>
-            <a:ext cx="1120138" cy="482980"/>
+            <a:off x="3898327" y="2905382"/>
+            <a:ext cx="1268032" cy="735216"/>
           </a:xfrm>
           <a:prstGeom prst="straightConnector1">
             <a:avLst/>
@@ -3498,7 +3772,7 @@
         </p:nvSpPr>
         <p:spPr>
           <a:xfrm>
-            <a:off x="479733" y="3239979"/>
+            <a:off x="479733" y="4116279"/>
             <a:ext cx="2116605" cy="307777"/>
           </a:xfrm>
           <a:prstGeom prst="rect">
@@ -3549,7 +3823,7 @@
         </p:nvCxnSpPr>
         <p:spPr>
           <a:xfrm>
-            <a:off x="1538034" y="2965461"/>
+            <a:off x="1538034" y="3841761"/>
             <a:ext cx="0" cy="289759"/>
           </a:xfrm>
           <a:prstGeom prst="straightConnector1">
@@ -3593,7 +3867,7 @@
         </p:nvSpPr>
         <p:spPr>
           <a:xfrm>
-            <a:off x="2959673" y="3796709"/>
+            <a:off x="2959673" y="4673009"/>
             <a:ext cx="938655" cy="307777"/>
           </a:xfrm>
           <a:prstGeom prst="rect">
@@ -3646,7 +3920,7 @@
         </p:nvCxnSpPr>
         <p:spPr>
           <a:xfrm>
-            <a:off x="1538036" y="3547755"/>
+            <a:off x="1538036" y="4424055"/>
             <a:ext cx="1421637" cy="402842"/>
           </a:xfrm>
           <a:prstGeom prst="straightConnector1">
@@ -3694,7 +3968,7 @@
         </p:nvCxnSpPr>
         <p:spPr>
           <a:xfrm flipH="1">
-            <a:off x="3898327" y="3000305"/>
+            <a:off x="3898327" y="3876605"/>
             <a:ext cx="1812306" cy="950292"/>
           </a:xfrm>
           <a:prstGeom prst="straightConnector1">
@@ -3738,7 +4012,7 @@
         </p:nvSpPr>
         <p:spPr>
           <a:xfrm>
-            <a:off x="5427130" y="3743364"/>
+            <a:off x="5427130" y="4619664"/>
             <a:ext cx="744436" cy="738664"/>
           </a:xfrm>
           <a:prstGeom prst="rect">
@@ -3829,7 +4103,7 @@
         </p:nvCxnSpPr>
         <p:spPr>
           <a:xfrm>
-            <a:off x="3429962" y="4054351"/>
+            <a:off x="3429962" y="4930651"/>
             <a:ext cx="0" cy="905596"/>
           </a:xfrm>
           <a:prstGeom prst="straightConnector1">
@@ -3875,7 +4149,7 @@
         </p:nvCxnSpPr>
         <p:spPr>
           <a:xfrm flipH="1">
-            <a:off x="3429001" y="4112696"/>
+            <a:off x="3429001" y="4988996"/>
             <a:ext cx="1998131" cy="457048"/>
           </a:xfrm>
           <a:prstGeom prst="straightConnector1">
@@ -3919,7 +4193,7 @@
         </p:nvSpPr>
         <p:spPr>
           <a:xfrm>
-            <a:off x="1731262" y="4200123"/>
+            <a:off x="1731262" y="5076423"/>
             <a:ext cx="1729383" cy="461665"/>
           </a:xfrm>
           <a:prstGeom prst="rect">
@@ -3968,7 +4242,7 @@
         </p:nvSpPr>
         <p:spPr>
           <a:xfrm>
-            <a:off x="2072986" y="4905346"/>
+            <a:off x="2072986" y="5781646"/>
             <a:ext cx="2712024" cy="307777"/>
           </a:xfrm>
           <a:prstGeom prst="rect">
@@ -4017,7 +4291,7 @@
         </p:nvSpPr>
         <p:spPr>
           <a:xfrm>
-            <a:off x="4732878" y="5300430"/>
+            <a:off x="4732878" y="6176730"/>
             <a:ext cx="1135247" cy="1046440"/>
           </a:xfrm>
           <a:prstGeom prst="rect">
@@ -4139,7 +4413,7 @@
         </p:nvSpPr>
         <p:spPr>
           <a:xfrm>
-            <a:off x="2221306" y="6110158"/>
+            <a:off x="2221306" y="6986458"/>
             <a:ext cx="2468768" cy="523220"/>
           </a:xfrm>
           <a:prstGeom prst="rect">
@@ -4190,7 +4464,7 @@
         </p:nvCxnSpPr>
         <p:spPr>
           <a:xfrm>
-            <a:off x="3573782" y="5138852"/>
+            <a:off x="3573782" y="6015152"/>
             <a:ext cx="1211228" cy="303998"/>
           </a:xfrm>
           <a:prstGeom prst="straightConnector1">
@@ -4234,7 +4508,7 @@
         </p:nvSpPr>
         <p:spPr>
           <a:xfrm>
-            <a:off x="5768539" y="5546652"/>
+            <a:off x="5768539" y="6422952"/>
             <a:ext cx="1042427" cy="461665"/>
           </a:xfrm>
           <a:prstGeom prst="rect">
@@ -4303,7 +4577,7 @@
         </p:nvSpPr>
         <p:spPr>
           <a:xfrm>
-            <a:off x="5125731" y="5652513"/>
+            <a:off x="5125731" y="6528813"/>
             <a:ext cx="742393" cy="204178"/>
           </a:xfrm>
           <a:prstGeom prst="arc">
@@ -4366,7 +4640,7 @@
         </p:nvCxnSpPr>
         <p:spPr>
           <a:xfrm flipH="1">
-            <a:off x="4500357" y="5966961"/>
+            <a:off x="4500357" y="6843261"/>
             <a:ext cx="302517" cy="220806"/>
           </a:xfrm>
           <a:prstGeom prst="straightConnector1">
@@ -4410,7 +4684,7 @@
         </p:nvSpPr>
         <p:spPr>
           <a:xfrm>
-            <a:off x="4922177" y="5546651"/>
+            <a:off x="4922177" y="6422951"/>
             <a:ext cx="113445" cy="800220"/>
           </a:xfrm>
           <a:prstGeom prst="leftBrace">
@@ -4466,7 +4740,7 @@
         </p:nvSpPr>
         <p:spPr>
           <a:xfrm>
-            <a:off x="1424215" y="6868032"/>
+            <a:off x="1424215" y="7744332"/>
             <a:ext cx="1367573" cy="307777"/>
           </a:xfrm>
           <a:prstGeom prst="rect">
@@ -4515,7 +4789,7 @@
         </p:nvSpPr>
         <p:spPr>
           <a:xfrm>
-            <a:off x="2811779" y="6873565"/>
+            <a:off x="2811779" y="7749865"/>
             <a:ext cx="2109932" cy="307777"/>
           </a:xfrm>
           <a:prstGeom prst="rect">
@@ -4564,7 +4838,7 @@
         </p:nvSpPr>
         <p:spPr>
           <a:xfrm>
-            <a:off x="1067309" y="7084008"/>
+            <a:off x="1067309" y="7960308"/>
             <a:ext cx="2109932" cy="830997"/>
           </a:xfrm>
           <a:prstGeom prst="rect">
@@ -4645,7 +4919,7 @@
         </p:nvSpPr>
         <p:spPr>
           <a:xfrm>
-            <a:off x="-158108" y="7175809"/>
+            <a:off x="-158108" y="8052109"/>
             <a:ext cx="1562331" cy="646331"/>
           </a:xfrm>
           <a:prstGeom prst="rect">
@@ -4710,7 +4984,7 @@
         </p:nvSpPr>
         <p:spPr>
           <a:xfrm>
-            <a:off x="1653529" y="7370662"/>
+            <a:off x="1653529" y="8246962"/>
             <a:ext cx="45719" cy="307777"/>
           </a:xfrm>
           <a:prstGeom prst="leftBrace">
@@ -4768,7 +5042,7 @@
         </p:nvCxnSpPr>
         <p:spPr>
           <a:xfrm>
-            <a:off x="963498" y="7518827"/>
+            <a:off x="963498" y="8395127"/>
             <a:ext cx="566588" cy="5723"/>
           </a:xfrm>
           <a:prstGeom prst="straightConnector1">
@@ -4814,7 +5088,7 @@
         </p:nvCxnSpPr>
         <p:spPr>
           <a:xfrm>
-            <a:off x="3428998" y="5164698"/>
+            <a:off x="3428998" y="6040998"/>
             <a:ext cx="0" cy="1008000"/>
           </a:xfrm>
           <a:prstGeom prst="straightConnector1">
@@ -4858,7 +5132,7 @@
         </p:nvSpPr>
         <p:spPr>
           <a:xfrm>
-            <a:off x="4046221" y="8268209"/>
+            <a:off x="4046221" y="9144509"/>
             <a:ext cx="2902922" cy="1231106"/>
           </a:xfrm>
           <a:prstGeom prst="rect">
@@ -4965,7 +5239,7 @@
         </p:nvSpPr>
         <p:spPr>
           <a:xfrm>
-            <a:off x="1190658" y="8287493"/>
+            <a:off x="1190658" y="9163793"/>
             <a:ext cx="2580199" cy="738664"/>
           </a:xfrm>
           <a:prstGeom prst="rect">
@@ -5033,7 +5307,7 @@
         </p:nvSpPr>
         <p:spPr>
           <a:xfrm>
-            <a:off x="1149350" y="9561771"/>
+            <a:off x="1149350" y="10438071"/>
             <a:ext cx="2580199" cy="307777"/>
           </a:xfrm>
           <a:prstGeom prst="rect">
@@ -5075,7 +5349,7 @@
         </p:nvSpPr>
         <p:spPr>
           <a:xfrm>
-            <a:off x="1560756" y="11451504"/>
+            <a:off x="1560756" y="12327804"/>
             <a:ext cx="4026051" cy="1600438"/>
           </a:xfrm>
           <a:prstGeom prst="rect">
@@ -5217,7 +5491,7 @@
         </p:nvCxnSpPr>
         <p:spPr>
           <a:xfrm>
-            <a:off x="1991830" y="7895766"/>
+            <a:off x="1991830" y="8772066"/>
             <a:ext cx="229476" cy="392521"/>
           </a:xfrm>
           <a:prstGeom prst="straightConnector1">
@@ -5263,7 +5537,7 @@
         </p:nvCxnSpPr>
         <p:spPr>
           <a:xfrm flipH="1">
-            <a:off x="2959673" y="7138836"/>
+            <a:off x="2959673" y="8015136"/>
             <a:ext cx="807769" cy="1149451"/>
           </a:xfrm>
           <a:prstGeom prst="straightConnector1">
@@ -5309,7 +5583,7 @@
         </p:nvCxnSpPr>
         <p:spPr>
           <a:xfrm flipH="1">
-            <a:off x="2408824" y="8981561"/>
+            <a:off x="2408824" y="9857861"/>
             <a:ext cx="1" cy="612262"/>
           </a:xfrm>
           <a:prstGeom prst="straightConnector1">
@@ -5355,7 +5629,7 @@
         </p:nvCxnSpPr>
         <p:spPr>
           <a:xfrm>
-            <a:off x="3428998" y="6588951"/>
+            <a:off x="3428998" y="7465251"/>
             <a:ext cx="274322" cy="350964"/>
           </a:xfrm>
           <a:prstGeom prst="straightConnector1">
@@ -5401,7 +5675,7 @@
         </p:nvCxnSpPr>
         <p:spPr>
           <a:xfrm flipH="1">
-            <a:off x="2466718" y="6581883"/>
+            <a:off x="2466718" y="7458183"/>
             <a:ext cx="962280" cy="364391"/>
           </a:xfrm>
           <a:prstGeom prst="straightConnector1">
@@ -5448,7 +5722,7 @@
         </p:nvCxnSpPr>
         <p:spPr>
           <a:xfrm>
-            <a:off x="4402658" y="6403366"/>
+            <a:off x="4402658" y="7279666"/>
             <a:ext cx="1095024" cy="1864843"/>
           </a:xfrm>
           <a:prstGeom prst="straightConnector1">
@@ -5495,7 +5769,7 @@
         </p:nvCxnSpPr>
         <p:spPr>
           <a:xfrm>
-            <a:off x="4708867" y="6072290"/>
+            <a:off x="4708867" y="6948590"/>
             <a:ext cx="788815" cy="2195919"/>
           </a:xfrm>
           <a:prstGeom prst="straightConnector1">
@@ -5541,7 +5815,7 @@
         </p:nvCxnSpPr>
         <p:spPr>
           <a:xfrm>
-            <a:off x="2439450" y="9869548"/>
+            <a:off x="2439450" y="10745848"/>
             <a:ext cx="1080323" cy="955482"/>
           </a:xfrm>
           <a:prstGeom prst="line">
@@ -5587,7 +5861,7 @@
         </p:nvCxnSpPr>
         <p:spPr>
           <a:xfrm flipH="1">
-            <a:off x="3519773" y="9499315"/>
+            <a:off x="3519773" y="10375615"/>
             <a:ext cx="1977909" cy="1324857"/>
           </a:xfrm>
           <a:prstGeom prst="line">
@@ -5632,7 +5906,7 @@
         </p:nvCxnSpPr>
         <p:spPr>
           <a:xfrm flipH="1">
-            <a:off x="3519772" y="10824172"/>
+            <a:off x="3519772" y="11700472"/>
             <a:ext cx="1" cy="612262"/>
           </a:xfrm>
           <a:prstGeom prst="straightConnector1">
@@ -5676,7 +5950,7 @@
         </p:nvSpPr>
         <p:spPr>
           <a:xfrm>
-            <a:off x="6350" y="11450193"/>
+            <a:off x="6350" y="12326493"/>
             <a:ext cx="1149350" cy="431800"/>
           </a:xfrm>
           <a:prstGeom prst="roundRect">
@@ -5738,7 +6012,7 @@
         </p:nvSpPr>
         <p:spPr>
           <a:xfrm>
-            <a:off x="312296" y="5622616"/>
+            <a:off x="312296" y="6498916"/>
             <a:ext cx="2069798" cy="307777"/>
           </a:xfrm>
           <a:prstGeom prst="rect">
@@ -5789,7 +6063,7 @@
         </p:nvCxnSpPr>
         <p:spPr>
           <a:xfrm flipV="1">
-            <a:off x="1885948" y="5164698"/>
+            <a:off x="1885948" y="6040998"/>
             <a:ext cx="580770" cy="519069"/>
           </a:xfrm>
           <a:prstGeom prst="straightConnector1">
@@ -5835,7 +6109,7 @@
         </p:nvCxnSpPr>
         <p:spPr>
           <a:xfrm>
-            <a:off x="1873716" y="5883004"/>
+            <a:off x="1873716" y="6759304"/>
             <a:ext cx="472167" cy="355166"/>
           </a:xfrm>
           <a:prstGeom prst="straightConnector1">
@@ -5865,12 +6139,63 @@
           </a:fontRef>
         </p:style>
       </p:cxnSp>
+      <p:sp>
+        <p:nvSpPr>
+          <p:cNvPr id="74" name="TextBox 73">
+            <a:extLst>
+              <a:ext uri="{FF2B5EF4-FFF2-40B4-BE49-F238E27FC236}">
+                <a16:creationId xmlns:a16="http://schemas.microsoft.com/office/drawing/2014/main" id="{B4EA40A6-D993-4327-B332-6BA086810054}"/>
+              </a:ext>
+            </a:extLst>
+          </p:cNvPr>
+          <p:cNvSpPr txBox="1"/>
+          <p:nvPr/>
+        </p:nvSpPr>
+        <p:spPr>
+          <a:xfrm>
+            <a:off x="5058242" y="-27147"/>
+            <a:ext cx="1890901" cy="1384995"/>
+          </a:xfrm>
+          <a:prstGeom prst="rect">
+            <a:avLst/>
+          </a:prstGeom>
+          <a:noFill/>
+        </p:spPr>
+        <p:txBody>
+          <a:bodyPr wrap="square" rtlCol="0">
+            <a:spAutoFit/>
+          </a:bodyPr>
+          <a:lstStyle/>
+          <a:p>
+            <a:pPr algn="ctr"/>
+            <a:r>
+              <a:rPr lang="en-GB" sz="1050" i="1" dirty="0">
+                <a:solidFill>
+                  <a:srgbClr val="969696"/>
+                </a:solidFill>
+              </a:rPr>
+              <a:t>Numbers in circles indicate the project section to which the associated work (indicated by colour) corresponds</a:t>
+            </a:r>
+          </a:p>
+          <a:p>
+            <a:pPr algn="ctr"/>
+            <a:r>
+              <a:rPr lang="en-GB" sz="1050" i="1" dirty="0">
+                <a:solidFill>
+                  <a:srgbClr val="969696"/>
+                </a:solidFill>
+              </a:rPr>
+              <a:t>Additionally each numbered script is given its own flow chart to demonstrate the process of the script.</a:t>
+            </a:r>
+          </a:p>
+        </p:txBody>
+      </p:sp>
       <p:grpSp>
         <p:nvGrpSpPr>
-          <p:cNvPr id="7" name="Group 6">
+          <p:cNvPr id="15" name="Group 14">
             <a:extLst>
               <a:ext uri="{FF2B5EF4-FFF2-40B4-BE49-F238E27FC236}">
-                <a16:creationId xmlns:a16="http://schemas.microsoft.com/office/drawing/2014/main" id="{4F279F56-716C-4D11-9918-2351AE9F1A79}"/>
+                <a16:creationId xmlns:a16="http://schemas.microsoft.com/office/drawing/2014/main" id="{4ADA4D7F-E767-4840-8670-E45CBA74A7E4}"/>
               </a:ext>
             </a:extLst>
           </p:cNvPr>
@@ -5879,76 +6204,18 @@
         </p:nvGrpSpPr>
         <p:grpSpPr>
           <a:xfrm>
-            <a:off x="5580912" y="1495009"/>
-            <a:ext cx="360000" cy="358577"/>
-            <a:chOff x="1387903" y="622415"/>
-            <a:chExt cx="360000" cy="358577"/>
+            <a:off x="67249" y="-6115"/>
+            <a:ext cx="5643384" cy="3418955"/>
+            <a:chOff x="67249" y="-6115"/>
+            <a:chExt cx="5643384" cy="3418955"/>
           </a:xfrm>
         </p:grpSpPr>
         <p:sp>
           <p:nvSpPr>
-            <p:cNvPr id="4" name="Oval 3">
+            <p:cNvPr id="5" name="TextBox 4">
               <a:extLst>
                 <a:ext uri="{FF2B5EF4-FFF2-40B4-BE49-F238E27FC236}">
-                  <a16:creationId xmlns:a16="http://schemas.microsoft.com/office/drawing/2014/main" id="{79B7DE22-94E0-487A-AF12-8C40B8CE033C}"/>
-                </a:ext>
-              </a:extLst>
-            </p:cNvPr>
-            <p:cNvSpPr/>
-            <p:nvPr/>
-          </p:nvSpPr>
-          <p:spPr>
-            <a:xfrm>
-              <a:off x="1387903" y="622415"/>
-              <a:ext cx="360000" cy="358577"/>
-            </a:xfrm>
-            <a:prstGeom prst="ellipse">
-              <a:avLst/>
-            </a:prstGeom>
-            <a:solidFill>
-              <a:schemeClr val="accent2">
-                <a:lumMod val="75000"/>
-              </a:schemeClr>
-            </a:solidFill>
-            <a:ln>
-              <a:solidFill>
-                <a:schemeClr val="accent2">
-                  <a:lumMod val="50000"/>
-                </a:schemeClr>
-              </a:solidFill>
-            </a:ln>
-          </p:spPr>
-          <p:style>
-            <a:lnRef idx="2">
-              <a:schemeClr val="accent2">
-                <a:shade val="50000"/>
-              </a:schemeClr>
-            </a:lnRef>
-            <a:fillRef idx="1">
-              <a:schemeClr val="accent2"/>
-            </a:fillRef>
-            <a:effectRef idx="0">
-              <a:schemeClr val="accent2"/>
-            </a:effectRef>
-            <a:fontRef idx="minor">
-              <a:schemeClr val="lt1"/>
-            </a:fontRef>
-          </p:style>
-          <p:txBody>
-            <a:bodyPr rtlCol="0" anchor="ctr"/>
-            <a:lstStyle/>
-            <a:p>
-              <a:pPr algn="ctr"/>
-              <a:endParaRPr lang="en-GB"/>
-            </a:p>
-          </p:txBody>
-        </p:sp>
-        <p:sp>
-          <p:nvSpPr>
-            <p:cNvPr id="56" name="TextBox 55">
-              <a:extLst>
-                <a:ext uri="{FF2B5EF4-FFF2-40B4-BE49-F238E27FC236}">
-                  <a16:creationId xmlns:a16="http://schemas.microsoft.com/office/drawing/2014/main" id="{1DA7A23F-4E09-467E-9B89-298040C40209}"/>
+                  <a16:creationId xmlns:a16="http://schemas.microsoft.com/office/drawing/2014/main" id="{2E248D1A-A8D2-43F0-B15C-D95B9A19A56D}"/>
                 </a:ext>
               </a:extLst>
             </p:cNvPr>
@@ -5957,8 +6224,390 @@
           </p:nvSpPr>
           <p:spPr>
             <a:xfrm>
-              <a:off x="1435720" y="649486"/>
-              <a:ext cx="276037" cy="307777"/>
+              <a:off x="4990692" y="2685815"/>
+              <a:ext cx="719941" cy="276999"/>
+            </a:xfrm>
+            <a:prstGeom prst="rect">
+              <a:avLst/>
+            </a:prstGeom>
+            <a:noFill/>
+          </p:spPr>
+          <p:txBody>
+            <a:bodyPr wrap="none" rtlCol="0">
+              <a:spAutoFit/>
+            </a:bodyPr>
+            <a:lstStyle/>
+            <a:p>
+              <a:r>
+                <a:rPr lang="en-GB" sz="1200" i="1" dirty="0">
+                  <a:solidFill>
+                    <a:schemeClr val="accent2">
+                      <a:lumMod val="75000"/>
+                    </a:schemeClr>
+                  </a:solidFill>
+                </a:rPr>
+                <a:t>Leighton</a:t>
+              </a:r>
+            </a:p>
+          </p:txBody>
+        </p:sp>
+        <p:sp>
+          <p:nvSpPr>
+            <p:cNvPr id="6" name="TextBox 5">
+              <a:extLst>
+                <a:ext uri="{FF2B5EF4-FFF2-40B4-BE49-F238E27FC236}">
+                  <a16:creationId xmlns:a16="http://schemas.microsoft.com/office/drawing/2014/main" id="{80E9BCFA-92CF-49D7-846E-62DDF1DA254D}"/>
+                </a:ext>
+              </a:extLst>
+            </p:cNvPr>
+            <p:cNvSpPr txBox="1"/>
+            <p:nvPr/>
+          </p:nvSpPr>
+          <p:spPr>
+            <a:xfrm>
+              <a:off x="195742" y="584737"/>
+              <a:ext cx="2663076" cy="461665"/>
+            </a:xfrm>
+            <a:prstGeom prst="rect">
+              <a:avLst/>
+            </a:prstGeom>
+            <a:noFill/>
+          </p:spPr>
+          <p:txBody>
+            <a:bodyPr wrap="square" rtlCol="0">
+              <a:spAutoFit/>
+            </a:bodyPr>
+            <a:lstStyle/>
+            <a:p>
+              <a:pPr algn="ctr"/>
+              <a:r>
+                <a:rPr lang="en-GB" sz="1200" i="1" dirty="0">
+                  <a:solidFill>
+                    <a:schemeClr val="accent2">
+                      <a:lumMod val="75000"/>
+                    </a:schemeClr>
+                  </a:solidFill>
+                </a:rPr>
+                <a:t>Filter plant pathogens and biomass degraders – evidence from literature</a:t>
+              </a:r>
+            </a:p>
+          </p:txBody>
+        </p:sp>
+        <p:cxnSp>
+          <p:nvCxnSpPr>
+            <p:cNvPr id="10" name="Straight Arrow Connector 9">
+              <a:extLst>
+                <a:ext uri="{FF2B5EF4-FFF2-40B4-BE49-F238E27FC236}">
+                  <a16:creationId xmlns:a16="http://schemas.microsoft.com/office/drawing/2014/main" id="{D9868C56-244A-451F-91A2-02330C0C5C5E}"/>
+                </a:ext>
+              </a:extLst>
+            </p:cNvPr>
+            <p:cNvCxnSpPr>
+              <a:cxnSpLocks/>
+            </p:cNvCxnSpPr>
+            <p:nvPr/>
+          </p:nvCxnSpPr>
+          <p:spPr>
+            <a:xfrm>
+              <a:off x="2549287" y="2605189"/>
+              <a:ext cx="627954" cy="0"/>
+            </a:xfrm>
+            <a:prstGeom prst="straightConnector1">
+              <a:avLst/>
+            </a:prstGeom>
+            <a:ln>
+              <a:tailEnd type="triangle"/>
+            </a:ln>
+          </p:spPr>
+          <p:style>
+            <a:lnRef idx="1">
+              <a:schemeClr val="accent2"/>
+            </a:lnRef>
+            <a:fillRef idx="0">
+              <a:schemeClr val="accent2"/>
+            </a:fillRef>
+            <a:effectRef idx="0">
+              <a:schemeClr val="accent2"/>
+            </a:effectRef>
+            <a:fontRef idx="minor">
+              <a:schemeClr val="tx1"/>
+            </a:fontRef>
+          </p:style>
+        </p:cxnSp>
+        <p:cxnSp>
+          <p:nvCxnSpPr>
+            <p:cNvPr id="20" name="Straight Arrow Connector 19">
+              <a:extLst>
+                <a:ext uri="{FF2B5EF4-FFF2-40B4-BE49-F238E27FC236}">
+                  <a16:creationId xmlns:a16="http://schemas.microsoft.com/office/drawing/2014/main" id="{658808FB-0384-4F82-AE99-29B2A1D7EF48}"/>
+                </a:ext>
+              </a:extLst>
+            </p:cNvPr>
+            <p:cNvCxnSpPr>
+              <a:cxnSpLocks/>
+            </p:cNvCxnSpPr>
+            <p:nvPr/>
+          </p:nvCxnSpPr>
+          <p:spPr>
+            <a:xfrm>
+              <a:off x="1509080" y="1324592"/>
+              <a:ext cx="0" cy="223050"/>
+            </a:xfrm>
+            <a:prstGeom prst="straightConnector1">
+              <a:avLst/>
+            </a:prstGeom>
+            <a:ln>
+              <a:tailEnd type="triangle"/>
+            </a:ln>
+          </p:spPr>
+          <p:style>
+            <a:lnRef idx="1">
+              <a:schemeClr val="accent2"/>
+            </a:lnRef>
+            <a:fillRef idx="0">
+              <a:schemeClr val="accent2"/>
+            </a:fillRef>
+            <a:effectRef idx="0">
+              <a:schemeClr val="accent2"/>
+            </a:effectRef>
+            <a:fontRef idx="minor">
+              <a:schemeClr val="tx1"/>
+            </a:fontRef>
+          </p:style>
+        </p:cxnSp>
+        <p:grpSp>
+          <p:nvGrpSpPr>
+            <p:cNvPr id="7" name="Group 6">
+              <a:extLst>
+                <a:ext uri="{FF2B5EF4-FFF2-40B4-BE49-F238E27FC236}">
+                  <a16:creationId xmlns:a16="http://schemas.microsoft.com/office/drawing/2014/main" id="{4F279F56-716C-4D11-9918-2351AE9F1A79}"/>
+                </a:ext>
+              </a:extLst>
+            </p:cNvPr>
+            <p:cNvGrpSpPr/>
+            <p:nvPr/>
+          </p:nvGrpSpPr>
+          <p:grpSpPr>
+            <a:xfrm>
+              <a:off x="67249" y="2425901"/>
+              <a:ext cx="360000" cy="358577"/>
+              <a:chOff x="1387903" y="622415"/>
+              <a:chExt cx="360000" cy="358577"/>
+            </a:xfrm>
+          </p:grpSpPr>
+          <p:sp>
+            <p:nvSpPr>
+              <p:cNvPr id="4" name="Oval 3">
+                <a:extLst>
+                  <a:ext uri="{FF2B5EF4-FFF2-40B4-BE49-F238E27FC236}">
+                    <a16:creationId xmlns:a16="http://schemas.microsoft.com/office/drawing/2014/main" id="{79B7DE22-94E0-487A-AF12-8C40B8CE033C}"/>
+                  </a:ext>
+                </a:extLst>
+              </p:cNvPr>
+              <p:cNvSpPr/>
+              <p:nvPr/>
+            </p:nvSpPr>
+            <p:spPr>
+              <a:xfrm>
+                <a:off x="1387903" y="622415"/>
+                <a:ext cx="360000" cy="358577"/>
+              </a:xfrm>
+              <a:prstGeom prst="ellipse">
+                <a:avLst/>
+              </a:prstGeom>
+              <a:solidFill>
+                <a:schemeClr val="accent2">
+                  <a:lumMod val="75000"/>
+                </a:schemeClr>
+              </a:solidFill>
+              <a:ln>
+                <a:solidFill>
+                  <a:schemeClr val="accent2">
+                    <a:lumMod val="50000"/>
+                  </a:schemeClr>
+                </a:solidFill>
+              </a:ln>
+            </p:spPr>
+            <p:style>
+              <a:lnRef idx="2">
+                <a:schemeClr val="accent2">
+                  <a:shade val="50000"/>
+                </a:schemeClr>
+              </a:lnRef>
+              <a:fillRef idx="1">
+                <a:schemeClr val="accent2"/>
+              </a:fillRef>
+              <a:effectRef idx="0">
+                <a:schemeClr val="accent2"/>
+              </a:effectRef>
+              <a:fontRef idx="minor">
+                <a:schemeClr val="lt1"/>
+              </a:fontRef>
+            </p:style>
+            <p:txBody>
+              <a:bodyPr rtlCol="0" anchor="ctr"/>
+              <a:lstStyle/>
+              <a:p>
+                <a:pPr algn="ctr"/>
+                <a:endParaRPr lang="en-GB"/>
+              </a:p>
+            </p:txBody>
+          </p:sp>
+          <p:sp>
+            <p:nvSpPr>
+              <p:cNvPr id="56" name="TextBox 55">
+                <a:extLst>
+                  <a:ext uri="{FF2B5EF4-FFF2-40B4-BE49-F238E27FC236}">
+                    <a16:creationId xmlns:a16="http://schemas.microsoft.com/office/drawing/2014/main" id="{1DA7A23F-4E09-467E-9B89-298040C40209}"/>
+                  </a:ext>
+                </a:extLst>
+              </p:cNvPr>
+              <p:cNvSpPr txBox="1"/>
+              <p:nvPr/>
+            </p:nvSpPr>
+            <p:spPr>
+              <a:xfrm>
+                <a:off x="1435720" y="649486"/>
+                <a:ext cx="276037" cy="307777"/>
+              </a:xfrm>
+              <a:prstGeom prst="rect">
+                <a:avLst/>
+              </a:prstGeom>
+              <a:noFill/>
+            </p:spPr>
+            <p:txBody>
+              <a:bodyPr wrap="none" rtlCol="0">
+                <a:spAutoFit/>
+              </a:bodyPr>
+              <a:lstStyle/>
+              <a:p>
+                <a:pPr algn="ctr"/>
+                <a:r>
+                  <a:rPr lang="en-GB" sz="1400" b="1" dirty="0">
+                    <a:solidFill>
+                      <a:schemeClr val="tx1">
+                        <a:lumMod val="85000"/>
+                        <a:lumOff val="15000"/>
+                      </a:schemeClr>
+                    </a:solidFill>
+                  </a:rPr>
+                  <a:t>1</a:t>
+                </a:r>
+                <a:endParaRPr lang="en-GB" sz="1200" dirty="0">
+                  <a:solidFill>
+                    <a:schemeClr val="tx1">
+                      <a:lumMod val="85000"/>
+                      <a:lumOff val="15000"/>
+                    </a:schemeClr>
+                  </a:solidFill>
+                </a:endParaRPr>
+              </a:p>
+            </p:txBody>
+          </p:sp>
+        </p:grpSp>
+        <p:sp>
+          <p:nvSpPr>
+            <p:cNvPr id="66" name="TextBox 65">
+              <a:extLst>
+                <a:ext uri="{FF2B5EF4-FFF2-40B4-BE49-F238E27FC236}">
+                  <a16:creationId xmlns:a16="http://schemas.microsoft.com/office/drawing/2014/main" id="{CC488942-9D81-47A8-9878-D69231F4189F}"/>
+                </a:ext>
+              </a:extLst>
+            </p:cNvPr>
+            <p:cNvSpPr txBox="1"/>
+            <p:nvPr/>
+          </p:nvSpPr>
+          <p:spPr>
+            <a:xfrm>
+              <a:off x="220554" y="-6115"/>
+              <a:ext cx="2613453" cy="461665"/>
+            </a:xfrm>
+            <a:prstGeom prst="rect">
+              <a:avLst/>
+            </a:prstGeom>
+            <a:noFill/>
+          </p:spPr>
+          <p:txBody>
+            <a:bodyPr wrap="square" rtlCol="0">
+              <a:spAutoFit/>
+            </a:bodyPr>
+            <a:lstStyle/>
+            <a:p>
+              <a:pPr algn="ctr"/>
+              <a:r>
+                <a:rPr lang="en-GB" sz="1200" i="1" dirty="0">
+                  <a:solidFill>
+                    <a:schemeClr val="accent2">
+                      <a:lumMod val="75000"/>
+                    </a:schemeClr>
+                  </a:solidFill>
+                </a:rPr>
+                <a:t>Fungi &amp; Oomycete species with genomic assemblies in NCBI</a:t>
+              </a:r>
+            </a:p>
+          </p:txBody>
+        </p:sp>
+        <p:sp>
+          <p:nvSpPr>
+            <p:cNvPr id="67" name="TextBox 66">
+              <a:extLst>
+                <a:ext uri="{FF2B5EF4-FFF2-40B4-BE49-F238E27FC236}">
+                  <a16:creationId xmlns:a16="http://schemas.microsoft.com/office/drawing/2014/main" id="{2A25AE5D-ED4B-4821-AF48-118C4C5A8552}"/>
+                </a:ext>
+              </a:extLst>
+            </p:cNvPr>
+            <p:cNvSpPr txBox="1"/>
+            <p:nvPr/>
+          </p:nvSpPr>
+          <p:spPr>
+            <a:xfrm>
+              <a:off x="389919" y="2443356"/>
+              <a:ext cx="2213827" cy="307777"/>
+            </a:xfrm>
+            <a:prstGeom prst="rect">
+              <a:avLst/>
+            </a:prstGeom>
+            <a:noFill/>
+          </p:spPr>
+          <p:txBody>
+            <a:bodyPr wrap="square" rtlCol="0">
+              <a:spAutoFit/>
+            </a:bodyPr>
+            <a:lstStyle/>
+            <a:p>
+              <a:pPr algn="ctr"/>
+              <a:r>
+                <a:rPr lang="en-GB" sz="1400" b="1" dirty="0">
+                  <a:solidFill>
+                    <a:schemeClr val="accent2"/>
+                  </a:solidFill>
+                </a:rPr>
+                <a:t>Extract_genomes_NCBI.py</a:t>
+              </a:r>
+              <a:endParaRPr lang="en-GB" sz="1200" b="1" dirty="0">
+                <a:solidFill>
+                  <a:schemeClr val="accent2"/>
+                </a:solidFill>
+              </a:endParaRPr>
+            </a:p>
+          </p:txBody>
+        </p:sp>
+        <p:sp>
+          <p:nvSpPr>
+            <p:cNvPr id="70" name="TextBox 69">
+              <a:extLst>
+                <a:ext uri="{FF2B5EF4-FFF2-40B4-BE49-F238E27FC236}">
+                  <a16:creationId xmlns:a16="http://schemas.microsoft.com/office/drawing/2014/main" id="{5B1FC922-8E89-4CE5-82FF-92395C888500}"/>
+                </a:ext>
+              </a:extLst>
+            </p:cNvPr>
+            <p:cNvSpPr txBox="1"/>
+            <p:nvPr/>
+          </p:nvSpPr>
+          <p:spPr>
+            <a:xfrm>
+              <a:off x="2740562" y="2243289"/>
+              <a:ext cx="1723549" cy="1169551"/>
             </a:xfrm>
             <a:prstGeom prst="rect">
               <a:avLst/>
@@ -5975,314 +6624,361 @@
               <a:r>
                 <a:rPr lang="en-GB" sz="1400" b="1" dirty="0">
                   <a:solidFill>
-                    <a:schemeClr val="tx1">
-                      <a:lumMod val="85000"/>
-                      <a:lumOff val="15000"/>
-                    </a:schemeClr>
+                    <a:schemeClr val="accent2"/>
                   </a:solidFill>
                 </a:rPr>
-                <a:t>1</a:t>
+                <a:t>Genomic Assemblies</a:t>
               </a:r>
-              <a:endParaRPr lang="en-GB" sz="1200" dirty="0">
-                <a:solidFill>
-                  <a:schemeClr val="tx1">
-                    <a:lumMod val="85000"/>
-                    <a:lumOff val="15000"/>
-                  </a:schemeClr>
+            </a:p>
+            <a:p>
+              <a:pPr algn="ctr"/>
+              <a:r>
+                <a:rPr lang="en-GB" sz="1400" dirty="0">
+                  <a:solidFill>
+                    <a:schemeClr val="accent2"/>
+                  </a:solidFill>
+                </a:rPr>
+                <a:t>From NCBI</a:t>
+              </a:r>
+            </a:p>
+            <a:p>
+              <a:pPr algn="ctr"/>
+              <a:r>
+                <a:rPr lang="en-GB" sz="1400" dirty="0">
+                  <a:solidFill>
+                    <a:schemeClr val="accent2"/>
+                  </a:solidFill>
+                </a:rPr>
+                <a:t>From collaborators</a:t>
+              </a:r>
+            </a:p>
+            <a:p>
+              <a:pPr algn="ctr"/>
+              <a:endParaRPr lang="en-GB" sz="1400" b="1" dirty="0">
+                <a:solidFill>
+                  <a:schemeClr val="accent2"/>
+                </a:solidFill>
+              </a:endParaRPr>
+            </a:p>
+            <a:p>
+              <a:pPr algn="ctr"/>
+              <a:endParaRPr lang="en-GB" sz="1400" dirty="0">
+                <a:solidFill>
+                  <a:schemeClr val="accent2"/>
                 </a:solidFill>
               </a:endParaRPr>
             </a:p>
           </p:txBody>
         </p:sp>
+        <p:cxnSp>
+          <p:nvCxnSpPr>
+            <p:cNvPr id="71" name="Straight Arrow Connector 70">
+              <a:extLst>
+                <a:ext uri="{FF2B5EF4-FFF2-40B4-BE49-F238E27FC236}">
+                  <a16:creationId xmlns:a16="http://schemas.microsoft.com/office/drawing/2014/main" id="{CF7515A4-9C72-4DB1-9C1D-8E9271DAFD7A}"/>
+                </a:ext>
+              </a:extLst>
+            </p:cNvPr>
+            <p:cNvCxnSpPr>
+              <a:cxnSpLocks/>
+            </p:cNvCxnSpPr>
+            <p:nvPr/>
+          </p:nvCxnSpPr>
+          <p:spPr>
+            <a:xfrm flipH="1">
+              <a:off x="4295775" y="2825640"/>
+              <a:ext cx="762467" cy="0"/>
+            </a:xfrm>
+            <a:prstGeom prst="straightConnector1">
+              <a:avLst/>
+            </a:prstGeom>
+            <a:ln>
+              <a:tailEnd type="triangle"/>
+            </a:ln>
+          </p:spPr>
+          <p:style>
+            <a:lnRef idx="1">
+              <a:schemeClr val="accent2"/>
+            </a:lnRef>
+            <a:fillRef idx="0">
+              <a:schemeClr val="accent2"/>
+            </a:fillRef>
+            <a:effectRef idx="0">
+              <a:schemeClr val="accent2"/>
+            </a:effectRef>
+            <a:fontRef idx="minor">
+              <a:schemeClr val="tx1"/>
+            </a:fontRef>
+          </p:style>
+        </p:cxnSp>
+        <p:sp>
+          <p:nvSpPr>
+            <p:cNvPr id="72" name="TextBox 71">
+              <a:extLst>
+                <a:ext uri="{FF2B5EF4-FFF2-40B4-BE49-F238E27FC236}">
+                  <a16:creationId xmlns:a16="http://schemas.microsoft.com/office/drawing/2014/main" id="{965D4E59-DB2C-494C-95EB-9A293DEA74CF}"/>
+                </a:ext>
+              </a:extLst>
+            </p:cNvPr>
+            <p:cNvSpPr txBox="1"/>
+            <p:nvPr/>
+          </p:nvSpPr>
+          <p:spPr>
+            <a:xfrm>
+              <a:off x="195742" y="956719"/>
+              <a:ext cx="2663076" cy="415498"/>
+            </a:xfrm>
+            <a:prstGeom prst="rect">
+              <a:avLst/>
+            </a:prstGeom>
+            <a:noFill/>
+          </p:spPr>
+          <p:txBody>
+            <a:bodyPr wrap="square" rtlCol="0">
+              <a:spAutoFit/>
+            </a:bodyPr>
+            <a:lstStyle/>
+            <a:p>
+              <a:pPr algn="ctr"/>
+              <a:r>
+                <a:rPr lang="en-GB" sz="1050" i="1" dirty="0">
+                  <a:solidFill>
+                    <a:schemeClr val="accent2">
+                      <a:lumMod val="60000"/>
+                      <a:lumOff val="40000"/>
+                    </a:schemeClr>
+                  </a:solidFill>
+                </a:rPr>
+                <a:t>Selection method / reasoning for decisions laid out in Selected_species.md</a:t>
+              </a:r>
+            </a:p>
+          </p:txBody>
+        </p:sp>
+        <p:sp>
+          <p:nvSpPr>
+            <p:cNvPr id="68" name="TextBox 67">
+              <a:extLst>
+                <a:ext uri="{FF2B5EF4-FFF2-40B4-BE49-F238E27FC236}">
+                  <a16:creationId xmlns:a16="http://schemas.microsoft.com/office/drawing/2014/main" id="{890F7AF2-3A73-4337-BED9-80813FCB6737}"/>
+                </a:ext>
+              </a:extLst>
+            </p:cNvPr>
+            <p:cNvSpPr txBox="1"/>
+            <p:nvPr/>
+          </p:nvSpPr>
+          <p:spPr>
+            <a:xfrm>
+              <a:off x="628057" y="1498978"/>
+              <a:ext cx="1706950" cy="276999"/>
+            </a:xfrm>
+            <a:prstGeom prst="rect">
+              <a:avLst/>
+            </a:prstGeom>
+            <a:noFill/>
+          </p:spPr>
+          <p:txBody>
+            <a:bodyPr wrap="square" rtlCol="0">
+              <a:spAutoFit/>
+            </a:bodyPr>
+            <a:lstStyle/>
+            <a:p>
+              <a:pPr algn="ctr"/>
+              <a:r>
+                <a:rPr lang="en-GB" sz="1200" b="1" dirty="0">
+                  <a:solidFill>
+                    <a:schemeClr val="accent2">
+                      <a:lumMod val="75000"/>
+                    </a:schemeClr>
+                  </a:solidFill>
+                </a:rPr>
+                <a:t>Species_list.txt</a:t>
+              </a:r>
+            </a:p>
+          </p:txBody>
+        </p:sp>
+        <p:sp>
+          <p:nvSpPr>
+            <p:cNvPr id="76" name="TextBox 75">
+              <a:extLst>
+                <a:ext uri="{FF2B5EF4-FFF2-40B4-BE49-F238E27FC236}">
+                  <a16:creationId xmlns:a16="http://schemas.microsoft.com/office/drawing/2014/main" id="{718FEC57-2474-4213-9A85-84418B145B97}"/>
+                </a:ext>
+              </a:extLst>
+            </p:cNvPr>
+            <p:cNvSpPr txBox="1"/>
+            <p:nvPr/>
+          </p:nvSpPr>
+          <p:spPr>
+            <a:xfrm>
+              <a:off x="489081" y="1709664"/>
+              <a:ext cx="2076397" cy="577081"/>
+            </a:xfrm>
+            <a:prstGeom prst="rect">
+              <a:avLst/>
+            </a:prstGeom>
+            <a:noFill/>
+          </p:spPr>
+          <p:txBody>
+            <a:bodyPr wrap="square" rtlCol="0">
+              <a:spAutoFit/>
+            </a:bodyPr>
+            <a:lstStyle/>
+            <a:p>
+              <a:pPr algn="ctr"/>
+              <a:r>
+                <a:rPr lang="en-GB" sz="1050" i="1" dirty="0">
+                  <a:solidFill>
+                    <a:schemeClr val="accent2">
+                      <a:lumMod val="60000"/>
+                      <a:lumOff val="40000"/>
+                    </a:schemeClr>
+                  </a:solidFill>
+                </a:rPr>
+                <a:t>Plain text file containing the genus and species names of selected fungi and oomycete species</a:t>
+              </a:r>
+            </a:p>
+          </p:txBody>
+        </p:sp>
+        <p:cxnSp>
+          <p:nvCxnSpPr>
+            <p:cNvPr id="84" name="Straight Arrow Connector 83">
+              <a:extLst>
+                <a:ext uri="{FF2B5EF4-FFF2-40B4-BE49-F238E27FC236}">
+                  <a16:creationId xmlns:a16="http://schemas.microsoft.com/office/drawing/2014/main" id="{6268912F-9A0E-4B9A-9AF5-76A8C91B96F7}"/>
+                </a:ext>
+              </a:extLst>
+            </p:cNvPr>
+            <p:cNvCxnSpPr>
+              <a:cxnSpLocks/>
+            </p:cNvCxnSpPr>
+            <p:nvPr/>
+          </p:nvCxnSpPr>
+          <p:spPr>
+            <a:xfrm>
+              <a:off x="1527280" y="400270"/>
+              <a:ext cx="0" cy="223050"/>
+            </a:xfrm>
+            <a:prstGeom prst="straightConnector1">
+              <a:avLst/>
+            </a:prstGeom>
+            <a:ln>
+              <a:tailEnd type="triangle"/>
+            </a:ln>
+          </p:spPr>
+          <p:style>
+            <a:lnRef idx="1">
+              <a:schemeClr val="accent2"/>
+            </a:lnRef>
+            <a:fillRef idx="0">
+              <a:schemeClr val="accent2"/>
+            </a:fillRef>
+            <a:effectRef idx="0">
+              <a:schemeClr val="accent2"/>
+            </a:effectRef>
+            <a:fontRef idx="minor">
+              <a:schemeClr val="tx1"/>
+            </a:fontRef>
+          </p:style>
+        </p:cxnSp>
+        <p:cxnSp>
+          <p:nvCxnSpPr>
+            <p:cNvPr id="86" name="Straight Arrow Connector 85">
+              <a:extLst>
+                <a:ext uri="{FF2B5EF4-FFF2-40B4-BE49-F238E27FC236}">
+                  <a16:creationId xmlns:a16="http://schemas.microsoft.com/office/drawing/2014/main" id="{BB94604A-2B33-42ED-9E21-E49A9DDEBC06}"/>
+                </a:ext>
+              </a:extLst>
+            </p:cNvPr>
+            <p:cNvCxnSpPr>
+              <a:cxnSpLocks/>
+            </p:cNvCxnSpPr>
+            <p:nvPr/>
+          </p:nvCxnSpPr>
+          <p:spPr>
+            <a:xfrm>
+              <a:off x="1491057" y="2267695"/>
+              <a:ext cx="0" cy="223050"/>
+            </a:xfrm>
+            <a:prstGeom prst="straightConnector1">
+              <a:avLst/>
+            </a:prstGeom>
+            <a:ln>
+              <a:tailEnd type="triangle"/>
+            </a:ln>
+          </p:spPr>
+          <p:style>
+            <a:lnRef idx="1">
+              <a:schemeClr val="accent2"/>
+            </a:lnRef>
+            <a:fillRef idx="0">
+              <a:schemeClr val="accent2"/>
+            </a:fillRef>
+            <a:effectRef idx="0">
+              <a:schemeClr val="accent2"/>
+            </a:effectRef>
+            <a:fontRef idx="minor">
+              <a:schemeClr val="tx1"/>
+            </a:fontRef>
+          </p:style>
+        </p:cxnSp>
+        <p:sp>
+          <p:nvSpPr>
+            <p:cNvPr id="87" name="TextBox 86">
+              <a:extLst>
+                <a:ext uri="{FF2B5EF4-FFF2-40B4-BE49-F238E27FC236}">
+                  <a16:creationId xmlns:a16="http://schemas.microsoft.com/office/drawing/2014/main" id="{8B45D38A-385B-4D75-891E-96DC400C877A}"/>
+                </a:ext>
+              </a:extLst>
+            </p:cNvPr>
+            <p:cNvSpPr txBox="1"/>
+            <p:nvPr/>
+          </p:nvSpPr>
+          <p:spPr>
+            <a:xfrm>
+              <a:off x="256212" y="2690683"/>
+              <a:ext cx="2542134" cy="577081"/>
+            </a:xfrm>
+            <a:prstGeom prst="rect">
+              <a:avLst/>
+            </a:prstGeom>
+            <a:noFill/>
+          </p:spPr>
+          <p:txBody>
+            <a:bodyPr wrap="square" rtlCol="0">
+              <a:spAutoFit/>
+            </a:bodyPr>
+            <a:lstStyle/>
+            <a:p>
+              <a:pPr algn="ctr"/>
+              <a:r>
+                <a:rPr lang="en-GB" sz="1050" i="1" dirty="0">
+                  <a:solidFill>
+                    <a:schemeClr val="accent2">
+                      <a:lumMod val="60000"/>
+                      <a:lumOff val="40000"/>
+                    </a:schemeClr>
+                  </a:solidFill>
+                </a:rPr>
+                <a:t>Species names passed to python script.</a:t>
+              </a:r>
+            </a:p>
+            <a:p>
+              <a:pPr algn="ctr"/>
+              <a:r>
+                <a:rPr lang="en-GB" sz="1050" i="1" dirty="0">
+                  <a:solidFill>
+                    <a:schemeClr val="accent2">
+                      <a:lumMod val="60000"/>
+                      <a:lumOff val="40000"/>
+                    </a:schemeClr>
+                  </a:solidFill>
+                </a:rPr>
+                <a:t>Python script will pull genomic assemblies from NCBI Assembly database</a:t>
+              </a:r>
+            </a:p>
+          </p:txBody>
+        </p:sp>
       </p:grpSp>
-      <p:sp>
-        <p:nvSpPr>
-          <p:cNvPr id="66" name="TextBox 65">
-            <a:extLst>
-              <a:ext uri="{FF2B5EF4-FFF2-40B4-BE49-F238E27FC236}">
-                <a16:creationId xmlns:a16="http://schemas.microsoft.com/office/drawing/2014/main" id="{CC488942-9D81-47A8-9878-D69231F4189F}"/>
-              </a:ext>
-            </a:extLst>
-          </p:cNvPr>
-          <p:cNvSpPr txBox="1"/>
-          <p:nvPr/>
-        </p:nvSpPr>
-        <p:spPr>
-          <a:xfrm>
-            <a:off x="960329" y="82082"/>
-            <a:ext cx="1706950" cy="276999"/>
-          </a:xfrm>
-          <a:prstGeom prst="rect">
-            <a:avLst/>
-          </a:prstGeom>
-          <a:noFill/>
-        </p:spPr>
-        <p:txBody>
-          <a:bodyPr wrap="square" rtlCol="0">
-            <a:spAutoFit/>
-          </a:bodyPr>
-          <a:lstStyle/>
-          <a:p>
-            <a:pPr algn="ctr"/>
-            <a:r>
-              <a:rPr lang="en-GB" sz="1200" i="1" dirty="0">
-                <a:solidFill>
-                  <a:schemeClr val="accent2">
-                    <a:lumMod val="75000"/>
-                  </a:schemeClr>
-                </a:solidFill>
-              </a:rPr>
-              <a:t>Fungi &amp; Oomycete</a:t>
-            </a:r>
-          </a:p>
-        </p:txBody>
-      </p:sp>
-      <p:sp>
-        <p:nvSpPr>
-          <p:cNvPr id="67" name="TextBox 66">
-            <a:extLst>
-              <a:ext uri="{FF2B5EF4-FFF2-40B4-BE49-F238E27FC236}">
-                <a16:creationId xmlns:a16="http://schemas.microsoft.com/office/drawing/2014/main" id="{2A25AE5D-ED4B-4821-AF48-118C4C5A8552}"/>
-              </a:ext>
-            </a:extLst>
-          </p:cNvPr>
-          <p:cNvSpPr txBox="1"/>
-          <p:nvPr/>
-        </p:nvSpPr>
-        <p:spPr>
-          <a:xfrm>
-            <a:off x="3372980" y="1433841"/>
-            <a:ext cx="2213827" cy="523220"/>
-          </a:xfrm>
-          <a:prstGeom prst="rect">
-            <a:avLst/>
-          </a:prstGeom>
-          <a:noFill/>
-        </p:spPr>
-        <p:txBody>
-          <a:bodyPr wrap="square" rtlCol="0">
-            <a:spAutoFit/>
-          </a:bodyPr>
-          <a:lstStyle/>
-          <a:p>
-            <a:r>
-              <a:rPr lang="en-GB" sz="1400" i="1" dirty="0">
-                <a:solidFill>
-                  <a:schemeClr val="accent2"/>
-                </a:solidFill>
-              </a:rPr>
-              <a:t>Python script Extract_genomes_NCBI.py</a:t>
-            </a:r>
-            <a:endParaRPr lang="en-GB" sz="1200" i="1" dirty="0">
-              <a:solidFill>
-                <a:schemeClr val="accent2"/>
-              </a:solidFill>
-            </a:endParaRPr>
-          </a:p>
-        </p:txBody>
-      </p:sp>
-      <p:sp>
-        <p:nvSpPr>
-          <p:cNvPr id="70" name="TextBox 69">
-            <a:extLst>
-              <a:ext uri="{FF2B5EF4-FFF2-40B4-BE49-F238E27FC236}">
-                <a16:creationId xmlns:a16="http://schemas.microsoft.com/office/drawing/2014/main" id="{5B1FC922-8E89-4CE5-82FF-92395C888500}"/>
-              </a:ext>
-            </a:extLst>
-          </p:cNvPr>
-          <p:cNvSpPr txBox="1"/>
-          <p:nvPr/>
-        </p:nvSpPr>
-        <p:spPr>
-          <a:xfrm>
-            <a:off x="2567222" y="650144"/>
-            <a:ext cx="1723549" cy="1169551"/>
-          </a:xfrm>
-          <a:prstGeom prst="rect">
-            <a:avLst/>
-          </a:prstGeom>
-          <a:noFill/>
-        </p:spPr>
-        <p:txBody>
-          <a:bodyPr wrap="none" rtlCol="0">
-            <a:spAutoFit/>
-          </a:bodyPr>
-          <a:lstStyle/>
-          <a:p>
-            <a:pPr algn="ctr"/>
-            <a:r>
-              <a:rPr lang="en-GB" sz="1400" b="1" dirty="0">
-                <a:solidFill>
-                  <a:schemeClr val="accent2"/>
-                </a:solidFill>
-              </a:rPr>
-              <a:t>Genomic Assemblies</a:t>
-            </a:r>
-          </a:p>
-          <a:p>
-            <a:pPr algn="ctr"/>
-            <a:r>
-              <a:rPr lang="en-GB" sz="1400" dirty="0">
-                <a:solidFill>
-                  <a:schemeClr val="accent2"/>
-                </a:solidFill>
-              </a:rPr>
-              <a:t>NCBI</a:t>
-            </a:r>
-          </a:p>
-          <a:p>
-            <a:pPr algn="ctr"/>
-            <a:r>
-              <a:rPr lang="en-GB" sz="1400" dirty="0">
-                <a:solidFill>
-                  <a:schemeClr val="accent2"/>
-                </a:solidFill>
-              </a:rPr>
-              <a:t>Collaborators</a:t>
-            </a:r>
-          </a:p>
-          <a:p>
-            <a:pPr algn="ctr"/>
-            <a:endParaRPr lang="en-GB" sz="1400" b="1" dirty="0">
-              <a:solidFill>
-                <a:schemeClr val="accent2"/>
-              </a:solidFill>
-            </a:endParaRPr>
-          </a:p>
-          <a:p>
-            <a:pPr algn="ctr"/>
-            <a:endParaRPr lang="en-GB" sz="1400" dirty="0">
-              <a:solidFill>
-                <a:schemeClr val="accent2"/>
-              </a:solidFill>
-            </a:endParaRPr>
-          </a:p>
-        </p:txBody>
-      </p:sp>
-      <p:cxnSp>
-        <p:nvCxnSpPr>
-          <p:cNvPr id="71" name="Straight Arrow Connector 70">
-            <a:extLst>
-              <a:ext uri="{FF2B5EF4-FFF2-40B4-BE49-F238E27FC236}">
-                <a16:creationId xmlns:a16="http://schemas.microsoft.com/office/drawing/2014/main" id="{CF7515A4-9C72-4DB1-9C1D-8E9271DAFD7A}"/>
-              </a:ext>
-            </a:extLst>
-          </p:cNvPr>
-          <p:cNvCxnSpPr>
-            <a:cxnSpLocks/>
-          </p:cNvCxnSpPr>
-          <p:nvPr/>
-        </p:nvCxnSpPr>
-        <p:spPr>
-          <a:xfrm>
-            <a:off x="2480757" y="1050906"/>
-            <a:ext cx="740038" cy="0"/>
-          </a:xfrm>
-          <a:prstGeom prst="straightConnector1">
-            <a:avLst/>
-          </a:prstGeom>
-          <a:ln>
-            <a:tailEnd type="triangle"/>
-          </a:ln>
-        </p:spPr>
-        <p:style>
-          <a:lnRef idx="1">
-            <a:schemeClr val="accent2"/>
-          </a:lnRef>
-          <a:fillRef idx="0">
-            <a:schemeClr val="accent2"/>
-          </a:fillRef>
-          <a:effectRef idx="0">
-            <a:schemeClr val="accent2"/>
-          </a:effectRef>
-          <a:fontRef idx="minor">
-            <a:schemeClr val="tx1"/>
-          </a:fontRef>
-        </p:style>
-      </p:cxnSp>
-      <p:sp>
-        <p:nvSpPr>
-          <p:cNvPr id="72" name="TextBox 71">
-            <a:extLst>
-              <a:ext uri="{FF2B5EF4-FFF2-40B4-BE49-F238E27FC236}">
-                <a16:creationId xmlns:a16="http://schemas.microsoft.com/office/drawing/2014/main" id="{965D4E59-DB2C-494C-95EB-9A293DEA74CF}"/>
-              </a:ext>
-            </a:extLst>
-          </p:cNvPr>
-          <p:cNvSpPr txBox="1"/>
-          <p:nvPr/>
-        </p:nvSpPr>
-        <p:spPr>
-          <a:xfrm>
-            <a:off x="764712" y="1285785"/>
-            <a:ext cx="1869069" cy="577081"/>
-          </a:xfrm>
-          <a:prstGeom prst="rect">
-            <a:avLst/>
-          </a:prstGeom>
-          <a:noFill/>
-        </p:spPr>
-        <p:txBody>
-          <a:bodyPr wrap="square" rtlCol="0">
-            <a:spAutoFit/>
-          </a:bodyPr>
-          <a:lstStyle/>
-          <a:p>
-            <a:pPr algn="ctr"/>
-            <a:r>
-              <a:rPr lang="en-GB" sz="1050" i="1" dirty="0">
-                <a:solidFill>
-                  <a:schemeClr val="accent2">
-                    <a:lumMod val="60000"/>
-                    <a:lumOff val="40000"/>
-                  </a:schemeClr>
-                </a:solidFill>
-              </a:rPr>
-              <a:t>Selection method / reasoning for decisions laid out in Selected_species.md</a:t>
-            </a:r>
-          </a:p>
-        </p:txBody>
-      </p:sp>
-      <p:sp>
-        <p:nvSpPr>
-          <p:cNvPr id="74" name="TextBox 73">
-            <a:extLst>
-              <a:ext uri="{FF2B5EF4-FFF2-40B4-BE49-F238E27FC236}">
-                <a16:creationId xmlns:a16="http://schemas.microsoft.com/office/drawing/2014/main" id="{B4EA40A6-D993-4327-B332-6BA086810054}"/>
-              </a:ext>
-            </a:extLst>
-          </p:cNvPr>
-          <p:cNvSpPr txBox="1"/>
-          <p:nvPr/>
-        </p:nvSpPr>
-        <p:spPr>
-          <a:xfrm>
-            <a:off x="5058242" y="-27147"/>
-            <a:ext cx="1890901" cy="738664"/>
-          </a:xfrm>
-          <a:prstGeom prst="rect">
-            <a:avLst/>
-          </a:prstGeom>
-          <a:noFill/>
-        </p:spPr>
-        <p:txBody>
-          <a:bodyPr wrap="square" rtlCol="0">
-            <a:spAutoFit/>
-          </a:bodyPr>
-          <a:lstStyle/>
-          <a:p>
-            <a:pPr algn="ctr"/>
-            <a:r>
-              <a:rPr lang="en-GB" sz="1050" i="1" dirty="0">
-                <a:solidFill>
-                  <a:srgbClr val="969696"/>
-                </a:solidFill>
-              </a:rPr>
-              <a:t>Numbers in circles indicate the project section to which the associated work (indicated by colour) corresponds</a:t>
-            </a:r>
-          </a:p>
-        </p:txBody>
-      </p:sp>
     </p:spTree>
     <p:extLst>
       <p:ext uri="{BB962C8B-B14F-4D97-AF65-F5344CB8AC3E}">
@@ -6492,8 +7188,8 @@
         </p:nvSpPr>
         <p:spPr>
           <a:xfrm>
-            <a:off x="2870643" y="1201870"/>
-            <a:ext cx="859531" cy="307777"/>
+            <a:off x="2664114" y="982737"/>
+            <a:ext cx="1272592" cy="523220"/>
           </a:xfrm>
           <a:prstGeom prst="rect">
             <a:avLst/>
@@ -6514,6 +7210,17 @@
                 </a:solidFill>
               </a:rPr>
               <a:t>Input file</a:t>
+            </a:r>
+          </a:p>
+          <a:p>
+            <a:pPr algn="ctr"/>
+            <a:r>
+              <a:rPr lang="en-GB" sz="1400" dirty="0">
+                <a:solidFill>
+                  <a:schemeClr val="accent2"/>
+                </a:solidFill>
+              </a:rPr>
+              <a:t>Species_list.txt</a:t>
             </a:r>
           </a:p>
         </p:txBody>

</xml_diff>